<commit_message>
Working it more and more... just trying to come up with a solution!
</commit_message>
<xml_diff>
--- a/gameEngineDesign.pptx
+++ b/gameEngineDesign.pptx
@@ -4,12 +4,17 @@
   <p:sldMasterIdLst>
     <p:sldMasterId id="2147483648" r:id="rId1"/>
   </p:sldMasterIdLst>
+  <p:notesMasterIdLst>
+    <p:notesMasterId r:id="rId9"/>
+  </p:notesMasterIdLst>
   <p:sldIdLst>
     <p:sldId id="256" r:id="rId2"/>
     <p:sldId id="257" r:id="rId3"/>
-    <p:sldId id="258" r:id="rId4"/>
-    <p:sldId id="259" r:id="rId5"/>
-    <p:sldId id="260" r:id="rId6"/>
+    <p:sldId id="261" r:id="rId4"/>
+    <p:sldId id="258" r:id="rId5"/>
+    <p:sldId id="259" r:id="rId6"/>
+    <p:sldId id="260" r:id="rId7"/>
+    <p:sldId id="262" r:id="rId8"/>
   </p:sldIdLst>
   <p:sldSz cx="9144000" cy="6858000" type="screen4x3"/>
   <p:notesSz cx="6858000" cy="9144000"/>
@@ -109,6 +114,440 @@
     </a:lvl9pPr>
   </p:defaultTextStyle>
 </p:presentation>
+</file>
+
+<file path=ppt/notesMasters/notesMaster1.xml><?xml version="1.0" encoding="utf-8"?>
+<p:notesMaster xmlns:a="http://schemas.openxmlformats.org/drawingml/2006/main" xmlns:r="http://schemas.openxmlformats.org/officeDocument/2006/relationships" xmlns:p="http://schemas.openxmlformats.org/presentationml/2006/main">
+  <p:cSld>
+    <p:bg>
+      <p:bgRef idx="1001">
+        <a:schemeClr val="bg1"/>
+      </p:bgRef>
+    </p:bg>
+    <p:spTree>
+      <p:nvGrpSpPr>
+        <p:cNvPr id="1" name=""/>
+        <p:cNvGrpSpPr/>
+        <p:nvPr/>
+      </p:nvGrpSpPr>
+      <p:grpSpPr>
+        <a:xfrm>
+          <a:off x="0" y="0"/>
+          <a:ext cx="0" cy="0"/>
+          <a:chOff x="0" y="0"/>
+          <a:chExt cx="0" cy="0"/>
+        </a:xfrm>
+      </p:grpSpPr>
+      <p:sp>
+        <p:nvSpPr>
+          <p:cNvPr id="2" name="Header Placeholder 1"/>
+          <p:cNvSpPr>
+            <a:spLocks noGrp="1"/>
+          </p:cNvSpPr>
+          <p:nvPr>
+            <p:ph type="hdr" sz="quarter"/>
+          </p:nvPr>
+        </p:nvSpPr>
+        <p:spPr>
+          <a:xfrm>
+            <a:off x="0" y="0"/>
+            <a:ext cx="2971800" cy="457200"/>
+          </a:xfrm>
+          <a:prstGeom prst="rect">
+            <a:avLst/>
+          </a:prstGeom>
+        </p:spPr>
+        <p:txBody>
+          <a:bodyPr vert="horz" lIns="91440" tIns="45720" rIns="91440" bIns="45720" rtlCol="0"/>
+          <a:lstStyle>
+            <a:lvl1pPr algn="l">
+              <a:defRPr sz="1200"/>
+            </a:lvl1pPr>
+          </a:lstStyle>
+          <a:p>
+            <a:endParaRPr lang="en-US"/>
+          </a:p>
+        </p:txBody>
+      </p:sp>
+      <p:sp>
+        <p:nvSpPr>
+          <p:cNvPr id="3" name="Date Placeholder 2"/>
+          <p:cNvSpPr>
+            <a:spLocks noGrp="1"/>
+          </p:cNvSpPr>
+          <p:nvPr>
+            <p:ph type="dt" idx="1"/>
+          </p:nvPr>
+        </p:nvSpPr>
+        <p:spPr>
+          <a:xfrm>
+            <a:off x="3884613" y="0"/>
+            <a:ext cx="2971800" cy="457200"/>
+          </a:xfrm>
+          <a:prstGeom prst="rect">
+            <a:avLst/>
+          </a:prstGeom>
+        </p:spPr>
+        <p:txBody>
+          <a:bodyPr vert="horz" lIns="91440" tIns="45720" rIns="91440" bIns="45720" rtlCol="0"/>
+          <a:lstStyle>
+            <a:lvl1pPr algn="r">
+              <a:defRPr sz="1200"/>
+            </a:lvl1pPr>
+          </a:lstStyle>
+          <a:p>
+            <a:fld id="{EFCB1F3C-141D-954A-8517-0E3BAF8D88EF}" type="datetimeFigureOut">
+              <a:rPr lang="en-US" smtClean="0"/>
+              <a:t>9/22/15</a:t>
+            </a:fld>
+            <a:endParaRPr lang="en-US"/>
+          </a:p>
+        </p:txBody>
+      </p:sp>
+      <p:sp>
+        <p:nvSpPr>
+          <p:cNvPr id="4" name="Slide Image Placeholder 3"/>
+          <p:cNvSpPr>
+            <a:spLocks noGrp="1" noRot="1" noChangeAspect="1"/>
+          </p:cNvSpPr>
+          <p:nvPr>
+            <p:ph type="sldImg" idx="2"/>
+          </p:nvPr>
+        </p:nvSpPr>
+        <p:spPr>
+          <a:xfrm>
+            <a:off x="1143000" y="685800"/>
+            <a:ext cx="4572000" cy="3429000"/>
+          </a:xfrm>
+          <a:prstGeom prst="rect">
+            <a:avLst/>
+          </a:prstGeom>
+          <a:noFill/>
+          <a:ln w="12700">
+            <a:solidFill>
+              <a:prstClr val="black"/>
+            </a:solidFill>
+          </a:ln>
+        </p:spPr>
+        <p:txBody>
+          <a:bodyPr vert="horz" lIns="91440" tIns="45720" rIns="91440" bIns="45720" rtlCol="0" anchor="ctr"/>
+          <a:lstStyle/>
+          <a:p>
+            <a:endParaRPr lang="en-US"/>
+          </a:p>
+        </p:txBody>
+      </p:sp>
+      <p:sp>
+        <p:nvSpPr>
+          <p:cNvPr id="5" name="Notes Placeholder 4"/>
+          <p:cNvSpPr>
+            <a:spLocks noGrp="1"/>
+          </p:cNvSpPr>
+          <p:nvPr>
+            <p:ph type="body" sz="quarter" idx="3"/>
+          </p:nvPr>
+        </p:nvSpPr>
+        <p:spPr>
+          <a:xfrm>
+            <a:off x="685800" y="4343400"/>
+            <a:ext cx="5486400" cy="4114800"/>
+          </a:xfrm>
+          <a:prstGeom prst="rect">
+            <a:avLst/>
+          </a:prstGeom>
+        </p:spPr>
+        <p:txBody>
+          <a:bodyPr vert="horz" lIns="91440" tIns="45720" rIns="91440" bIns="45720" rtlCol="0"/>
+          <a:lstStyle/>
+          <a:p>
+            <a:pPr lvl="0"/>
+            <a:r>
+              <a:rPr lang="en-US" smtClean="0"/>
+              <a:t>Click to edit Master text styles</a:t>
+            </a:r>
+          </a:p>
+          <a:p>
+            <a:pPr lvl="1"/>
+            <a:r>
+              <a:rPr lang="en-US" smtClean="0"/>
+              <a:t>Second level</a:t>
+            </a:r>
+          </a:p>
+          <a:p>
+            <a:pPr lvl="2"/>
+            <a:r>
+              <a:rPr lang="en-US" smtClean="0"/>
+              <a:t>Third level</a:t>
+            </a:r>
+          </a:p>
+          <a:p>
+            <a:pPr lvl="3"/>
+            <a:r>
+              <a:rPr lang="en-US" smtClean="0"/>
+              <a:t>Fourth level</a:t>
+            </a:r>
+          </a:p>
+          <a:p>
+            <a:pPr lvl="4"/>
+            <a:r>
+              <a:rPr lang="en-US" smtClean="0"/>
+              <a:t>Fifth level</a:t>
+            </a:r>
+            <a:endParaRPr lang="en-US"/>
+          </a:p>
+        </p:txBody>
+      </p:sp>
+      <p:sp>
+        <p:nvSpPr>
+          <p:cNvPr id="6" name="Footer Placeholder 5"/>
+          <p:cNvSpPr>
+            <a:spLocks noGrp="1"/>
+          </p:cNvSpPr>
+          <p:nvPr>
+            <p:ph type="ftr" sz="quarter" idx="4"/>
+          </p:nvPr>
+        </p:nvSpPr>
+        <p:spPr>
+          <a:xfrm>
+            <a:off x="0" y="8685213"/>
+            <a:ext cx="2971800" cy="457200"/>
+          </a:xfrm>
+          <a:prstGeom prst="rect">
+            <a:avLst/>
+          </a:prstGeom>
+        </p:spPr>
+        <p:txBody>
+          <a:bodyPr vert="horz" lIns="91440" tIns="45720" rIns="91440" bIns="45720" rtlCol="0" anchor="b"/>
+          <a:lstStyle>
+            <a:lvl1pPr algn="l">
+              <a:defRPr sz="1200"/>
+            </a:lvl1pPr>
+          </a:lstStyle>
+          <a:p>
+            <a:endParaRPr lang="en-US"/>
+          </a:p>
+        </p:txBody>
+      </p:sp>
+      <p:sp>
+        <p:nvSpPr>
+          <p:cNvPr id="7" name="Slide Number Placeholder 6"/>
+          <p:cNvSpPr>
+            <a:spLocks noGrp="1"/>
+          </p:cNvSpPr>
+          <p:nvPr>
+            <p:ph type="sldNum" sz="quarter" idx="5"/>
+          </p:nvPr>
+        </p:nvSpPr>
+        <p:spPr>
+          <a:xfrm>
+            <a:off x="3884613" y="8685213"/>
+            <a:ext cx="2971800" cy="457200"/>
+          </a:xfrm>
+          <a:prstGeom prst="rect">
+            <a:avLst/>
+          </a:prstGeom>
+        </p:spPr>
+        <p:txBody>
+          <a:bodyPr vert="horz" lIns="91440" tIns="45720" rIns="91440" bIns="45720" rtlCol="0" anchor="b"/>
+          <a:lstStyle>
+            <a:lvl1pPr algn="r">
+              <a:defRPr sz="1200"/>
+            </a:lvl1pPr>
+          </a:lstStyle>
+          <a:p>
+            <a:fld id="{EC9943E2-7D5B-534C-B615-2D892D69C1A8}" type="slidenum">
+              <a:rPr lang="en-US" smtClean="0"/>
+              <a:t>‹#›</a:t>
+            </a:fld>
+            <a:endParaRPr lang="en-US"/>
+          </a:p>
+        </p:txBody>
+      </p:sp>
+    </p:spTree>
+    <p:extLst>
+      <p:ext uri="{BB962C8B-B14F-4D97-AF65-F5344CB8AC3E}">
+        <p14:creationId xmlns:p14="http://schemas.microsoft.com/office/powerpoint/2010/main" val="1575485055"/>
+      </p:ext>
+    </p:extLst>
+  </p:cSld>
+  <p:clrMap bg1="lt1" tx1="dk1" bg2="lt2" tx2="dk2" accent1="accent1" accent2="accent2" accent3="accent3" accent4="accent4" accent5="accent5" accent6="accent6" hlink="hlink" folHlink="folHlink"/>
+  <p:notesStyle>
+    <a:lvl1pPr marL="0" algn="l" defTabSz="457200" rtl="0" eaLnBrk="1" latinLnBrk="0" hangingPunct="1">
+      <a:defRPr sz="1200" kern="1200">
+        <a:solidFill>
+          <a:schemeClr val="tx1"/>
+        </a:solidFill>
+        <a:latin typeface="+mn-lt"/>
+        <a:ea typeface="+mn-ea"/>
+        <a:cs typeface="+mn-cs"/>
+      </a:defRPr>
+    </a:lvl1pPr>
+    <a:lvl2pPr marL="457200" algn="l" defTabSz="457200" rtl="0" eaLnBrk="1" latinLnBrk="0" hangingPunct="1">
+      <a:defRPr sz="1200" kern="1200">
+        <a:solidFill>
+          <a:schemeClr val="tx1"/>
+        </a:solidFill>
+        <a:latin typeface="+mn-lt"/>
+        <a:ea typeface="+mn-ea"/>
+        <a:cs typeface="+mn-cs"/>
+      </a:defRPr>
+    </a:lvl2pPr>
+    <a:lvl3pPr marL="914400" algn="l" defTabSz="457200" rtl="0" eaLnBrk="1" latinLnBrk="0" hangingPunct="1">
+      <a:defRPr sz="1200" kern="1200">
+        <a:solidFill>
+          <a:schemeClr val="tx1"/>
+        </a:solidFill>
+        <a:latin typeface="+mn-lt"/>
+        <a:ea typeface="+mn-ea"/>
+        <a:cs typeface="+mn-cs"/>
+      </a:defRPr>
+    </a:lvl3pPr>
+    <a:lvl4pPr marL="1371600" algn="l" defTabSz="457200" rtl="0" eaLnBrk="1" latinLnBrk="0" hangingPunct="1">
+      <a:defRPr sz="1200" kern="1200">
+        <a:solidFill>
+          <a:schemeClr val="tx1"/>
+        </a:solidFill>
+        <a:latin typeface="+mn-lt"/>
+        <a:ea typeface="+mn-ea"/>
+        <a:cs typeface="+mn-cs"/>
+      </a:defRPr>
+    </a:lvl4pPr>
+    <a:lvl5pPr marL="1828800" algn="l" defTabSz="457200" rtl="0" eaLnBrk="1" latinLnBrk="0" hangingPunct="1">
+      <a:defRPr sz="1200" kern="1200">
+        <a:solidFill>
+          <a:schemeClr val="tx1"/>
+        </a:solidFill>
+        <a:latin typeface="+mn-lt"/>
+        <a:ea typeface="+mn-ea"/>
+        <a:cs typeface="+mn-cs"/>
+      </a:defRPr>
+    </a:lvl5pPr>
+    <a:lvl6pPr marL="2286000" algn="l" defTabSz="457200" rtl="0" eaLnBrk="1" latinLnBrk="0" hangingPunct="1">
+      <a:defRPr sz="1200" kern="1200">
+        <a:solidFill>
+          <a:schemeClr val="tx1"/>
+        </a:solidFill>
+        <a:latin typeface="+mn-lt"/>
+        <a:ea typeface="+mn-ea"/>
+        <a:cs typeface="+mn-cs"/>
+      </a:defRPr>
+    </a:lvl6pPr>
+    <a:lvl7pPr marL="2743200" algn="l" defTabSz="457200" rtl="0" eaLnBrk="1" latinLnBrk="0" hangingPunct="1">
+      <a:defRPr sz="1200" kern="1200">
+        <a:solidFill>
+          <a:schemeClr val="tx1"/>
+        </a:solidFill>
+        <a:latin typeface="+mn-lt"/>
+        <a:ea typeface="+mn-ea"/>
+        <a:cs typeface="+mn-cs"/>
+      </a:defRPr>
+    </a:lvl7pPr>
+    <a:lvl8pPr marL="3200400" algn="l" defTabSz="457200" rtl="0" eaLnBrk="1" latinLnBrk="0" hangingPunct="1">
+      <a:defRPr sz="1200" kern="1200">
+        <a:solidFill>
+          <a:schemeClr val="tx1"/>
+        </a:solidFill>
+        <a:latin typeface="+mn-lt"/>
+        <a:ea typeface="+mn-ea"/>
+        <a:cs typeface="+mn-cs"/>
+      </a:defRPr>
+    </a:lvl8pPr>
+    <a:lvl9pPr marL="3657600" algn="l" defTabSz="457200" rtl="0" eaLnBrk="1" latinLnBrk="0" hangingPunct="1">
+      <a:defRPr sz="1200" kern="1200">
+        <a:solidFill>
+          <a:schemeClr val="tx1"/>
+        </a:solidFill>
+        <a:latin typeface="+mn-lt"/>
+        <a:ea typeface="+mn-ea"/>
+        <a:cs typeface="+mn-cs"/>
+      </a:defRPr>
+    </a:lvl9pPr>
+  </p:notesStyle>
+</p:notesMaster>
+</file>
+
+<file path=ppt/notesSlides/notesSlide1.xml><?xml version="1.0" encoding="utf-8"?>
+<p:notes xmlns:a="http://schemas.openxmlformats.org/drawingml/2006/main" xmlns:r="http://schemas.openxmlformats.org/officeDocument/2006/relationships" xmlns:p="http://schemas.openxmlformats.org/presentationml/2006/main">
+  <p:cSld>
+    <p:spTree>
+      <p:nvGrpSpPr>
+        <p:cNvPr id="1" name=""/>
+        <p:cNvGrpSpPr/>
+        <p:nvPr/>
+      </p:nvGrpSpPr>
+      <p:grpSpPr>
+        <a:xfrm>
+          <a:off x="0" y="0"/>
+          <a:ext cx="0" cy="0"/>
+          <a:chOff x="0" y="0"/>
+          <a:chExt cx="0" cy="0"/>
+        </a:xfrm>
+      </p:grpSpPr>
+      <p:sp>
+        <p:nvSpPr>
+          <p:cNvPr id="2" name="Slide Image Placeholder 1"/>
+          <p:cNvSpPr>
+            <a:spLocks noGrp="1" noRot="1" noChangeAspect="1"/>
+          </p:cNvSpPr>
+          <p:nvPr>
+            <p:ph type="sldImg"/>
+          </p:nvPr>
+        </p:nvSpPr>
+        <p:spPr/>
+      </p:sp>
+      <p:sp>
+        <p:nvSpPr>
+          <p:cNvPr id="3" name="Notes Placeholder 2"/>
+          <p:cNvSpPr>
+            <a:spLocks noGrp="1"/>
+          </p:cNvSpPr>
+          <p:nvPr>
+            <p:ph type="body" idx="1"/>
+          </p:nvPr>
+        </p:nvSpPr>
+        <p:spPr/>
+        <p:txBody>
+          <a:bodyPr/>
+          <a:lstStyle/>
+          <a:p>
+            <a:endParaRPr lang="en-US" dirty="0"/>
+          </a:p>
+        </p:txBody>
+      </p:sp>
+      <p:sp>
+        <p:nvSpPr>
+          <p:cNvPr id="4" name="Slide Number Placeholder 3"/>
+          <p:cNvSpPr>
+            <a:spLocks noGrp="1"/>
+          </p:cNvSpPr>
+          <p:nvPr>
+            <p:ph type="sldNum" sz="quarter" idx="10"/>
+          </p:nvPr>
+        </p:nvSpPr>
+        <p:spPr/>
+        <p:txBody>
+          <a:bodyPr/>
+          <a:lstStyle/>
+          <a:p>
+            <a:fld id="{EC9943E2-7D5B-534C-B615-2D892D69C1A8}" type="slidenum">
+              <a:rPr lang="en-US" smtClean="0"/>
+              <a:t>2</a:t>
+            </a:fld>
+            <a:endParaRPr lang="en-US"/>
+          </a:p>
+        </p:txBody>
+      </p:sp>
+    </p:spTree>
+    <p:extLst>
+      <p:ext uri="{BB962C8B-B14F-4D97-AF65-F5344CB8AC3E}">
+        <p14:creationId xmlns:p14="http://schemas.microsoft.com/office/powerpoint/2010/main" val="1371783169"/>
+      </p:ext>
+    </p:extLst>
+  </p:cSld>
+  <p:clrMapOvr>
+    <a:masterClrMapping/>
+  </p:clrMapOvr>
+</p:notes>
 </file>
 
 <file path=ppt/slideLayouts/slideLayout1.xml><?xml version="1.0" encoding="utf-8"?>
@@ -3187,34 +3626,6 @@
       </p:grpSpPr>
       <p:sp>
         <p:nvSpPr>
-          <p:cNvPr id="2" name="Title 1"/>
-          <p:cNvSpPr>
-            <a:spLocks noGrp="1"/>
-          </p:cNvSpPr>
-          <p:nvPr>
-            <p:ph type="title"/>
-          </p:nvPr>
-        </p:nvSpPr>
-        <p:spPr>
-          <a:xfrm>
-            <a:off x="457200" y="0"/>
-            <a:ext cx="8229600" cy="845542"/>
-          </a:xfrm>
-        </p:spPr>
-        <p:txBody>
-          <a:bodyPr/>
-          <a:lstStyle/>
-          <a:p>
-            <a:r>
-              <a:rPr lang="en-US" dirty="0" smtClean="0"/>
-              <a:t>Game Finite State Machine</a:t>
-            </a:r>
-            <a:endParaRPr lang="en-US" dirty="0"/>
-          </a:p>
-        </p:txBody>
-      </p:sp>
-      <p:sp>
-        <p:nvSpPr>
           <p:cNvPr id="17" name="TextBox 16"/>
           <p:cNvSpPr txBox="1">
             <a:spLocks/>
@@ -3223,7 +3634,7 @@
         </p:nvSpPr>
         <p:spPr>
           <a:xfrm>
-            <a:off x="216945" y="1062180"/>
+            <a:off x="216945" y="845542"/>
             <a:ext cx="1891826" cy="1143000"/>
           </a:xfrm>
           <a:prstGeom prst="roundRect">
@@ -3253,7 +3664,7 @@
       </p:sp>
       <p:sp>
         <p:nvSpPr>
-          <p:cNvPr id="20" name="TextBox 19"/>
+          <p:cNvPr id="26" name="TextBox 25"/>
           <p:cNvSpPr txBox="1">
             <a:spLocks/>
           </p:cNvSpPr>
@@ -3261,17 +3672,14 @@
         </p:nvSpPr>
         <p:spPr>
           <a:xfrm>
-            <a:off x="5525872" y="1657160"/>
-            <a:ext cx="1543679" cy="460787"/>
-          </a:xfrm>
-          <a:prstGeom prst="rightArrow">
-            <a:avLst>
-              <a:gd name="adj1" fmla="val 50000"/>
-              <a:gd name="adj2" fmla="val 37112"/>
-            </a:avLst>
+            <a:off x="6307128" y="5261290"/>
+            <a:ext cx="1891826" cy="1143000"/>
+          </a:xfrm>
+          <a:prstGeom prst="roundRect">
+            <a:avLst/>
           </a:prstGeom>
           <a:solidFill>
-            <a:schemeClr val="tx1"/>
+            <a:schemeClr val="accent1"/>
           </a:solidFill>
         </p:spPr>
         <p:txBody>
@@ -3280,24 +3688,157 @@
           </a:bodyPr>
           <a:lstStyle/>
           <a:p>
-            <a:pPr algn="ctr">
-              <a:lnSpc>
-                <a:spcPct val="60000"/>
-              </a:lnSpc>
-            </a:pPr>
-            <a:r>
-              <a:rPr lang="en-US" sz="1400" dirty="0" smtClean="0">
+            <a:pPr algn="ctr"/>
+            <a:r>
+              <a:rPr lang="en-US" sz="2400" dirty="0" smtClean="0">
                 <a:solidFill>
                   <a:schemeClr val="bg1"/>
                 </a:solidFill>
               </a:rPr>
-              <a:t>MOVE ENTERED</a:t>
-            </a:r>
-            <a:endParaRPr lang="en-US" dirty="0" smtClean="0">
-              <a:solidFill>
-                <a:schemeClr val="bg1"/>
-              </a:solidFill>
-            </a:endParaRPr>
+              <a:t>END</a:t>
+            </a:r>
+          </a:p>
+        </p:txBody>
+      </p:sp>
+      <p:sp>
+        <p:nvSpPr>
+          <p:cNvPr id="25" name="TextBox 24"/>
+          <p:cNvSpPr txBox="1">
+            <a:spLocks/>
+          </p:cNvSpPr>
+          <p:nvPr/>
+        </p:nvSpPr>
+        <p:spPr>
+          <a:xfrm>
+            <a:off x="6794974" y="845540"/>
+            <a:ext cx="1891826" cy="1143000"/>
+          </a:xfrm>
+          <a:prstGeom prst="roundRect">
+            <a:avLst/>
+          </a:prstGeom>
+          <a:solidFill>
+            <a:schemeClr val="accent1"/>
+          </a:solidFill>
+        </p:spPr>
+        <p:txBody>
+          <a:bodyPr wrap="square" rtlCol="0" anchor="ctr" anchorCtr="1">
+            <a:noAutofit/>
+          </a:bodyPr>
+          <a:lstStyle/>
+          <a:p>
+            <a:pPr algn="ctr"/>
+            <a:r>
+              <a:rPr lang="en-US" sz="2400" dirty="0" smtClean="0">
+                <a:solidFill>
+                  <a:schemeClr val="bg1"/>
+                </a:solidFill>
+              </a:rPr>
+              <a:t>POPUP CONTINUE</a:t>
+            </a:r>
+          </a:p>
+        </p:txBody>
+      </p:sp>
+      <p:sp>
+        <p:nvSpPr>
+          <p:cNvPr id="22" name="TextBox 21"/>
+          <p:cNvSpPr txBox="1">
+            <a:spLocks/>
+          </p:cNvSpPr>
+          <p:nvPr/>
+        </p:nvSpPr>
+        <p:spPr>
+          <a:xfrm>
+            <a:off x="6077876" y="3155475"/>
+            <a:ext cx="1891826" cy="1143000"/>
+          </a:xfrm>
+          <a:prstGeom prst="roundRect">
+            <a:avLst/>
+          </a:prstGeom>
+          <a:solidFill>
+            <a:schemeClr val="accent1"/>
+          </a:solidFill>
+        </p:spPr>
+        <p:txBody>
+          <a:bodyPr wrap="square" rtlCol="0" anchor="ctr" anchorCtr="1">
+            <a:noAutofit/>
+          </a:bodyPr>
+          <a:lstStyle/>
+          <a:p>
+            <a:pPr algn="ctr"/>
+            <a:r>
+              <a:rPr lang="en-US" sz="2400" dirty="0" smtClean="0">
+                <a:solidFill>
+                  <a:schemeClr val="bg1"/>
+                </a:solidFill>
+              </a:rPr>
+              <a:t>PAYING FOR CONTINUE</a:t>
+            </a:r>
+          </a:p>
+        </p:txBody>
+      </p:sp>
+      <p:sp>
+        <p:nvSpPr>
+          <p:cNvPr id="21" name="TextBox 20"/>
+          <p:cNvSpPr txBox="1">
+            <a:spLocks/>
+          </p:cNvSpPr>
+          <p:nvPr/>
+        </p:nvSpPr>
+        <p:spPr>
+          <a:xfrm>
+            <a:off x="216946" y="3501874"/>
+            <a:ext cx="1891826" cy="1143000"/>
+          </a:xfrm>
+          <a:prstGeom prst="roundRect">
+            <a:avLst/>
+          </a:prstGeom>
+          <a:solidFill>
+            <a:schemeClr val="accent1"/>
+          </a:solidFill>
+        </p:spPr>
+        <p:txBody>
+          <a:bodyPr wrap="square" rtlCol="0" anchor="ctr" anchorCtr="1">
+            <a:noAutofit/>
+          </a:bodyPr>
+          <a:lstStyle/>
+          <a:p>
+            <a:pPr algn="ctr"/>
+            <a:r>
+              <a:rPr lang="en-US" sz="2400" dirty="0" smtClean="0">
+                <a:solidFill>
+                  <a:schemeClr val="bg1"/>
+                </a:solidFill>
+              </a:rPr>
+              <a:t>PAUSED</a:t>
+            </a:r>
+          </a:p>
+        </p:txBody>
+      </p:sp>
+      <p:sp>
+        <p:nvSpPr>
+          <p:cNvPr id="2" name="Title 1"/>
+          <p:cNvSpPr>
+            <a:spLocks noGrp="1"/>
+          </p:cNvSpPr>
+          <p:nvPr>
+            <p:ph type="title"/>
+          </p:nvPr>
+        </p:nvSpPr>
+        <p:spPr>
+          <a:xfrm>
+            <a:off x="457200" y="0"/>
+            <a:ext cx="8229600" cy="845542"/>
+          </a:xfrm>
+        </p:spPr>
+        <p:txBody>
+          <a:bodyPr/>
+          <a:lstStyle/>
+          <a:p>
+            <a:r>
+              <a:rPr lang="en-US" dirty="0" smtClean="0"/>
+              <a:t>Game Finite State Machine</a:t>
+            </a:r>
+            <a:endParaRPr lang="en-US" dirty="0"/>
           </a:p>
         </p:txBody>
       </p:sp>
@@ -3311,7 +3852,7 @@
         </p:nvSpPr>
         <p:spPr>
           <a:xfrm>
-            <a:off x="7069551" y="1062180"/>
+            <a:off x="3812549" y="845542"/>
             <a:ext cx="1891826" cy="1143000"/>
           </a:xfrm>
           <a:prstGeom prst="roundRect">
@@ -3341,7 +3882,7 @@
       </p:sp>
       <p:sp>
         <p:nvSpPr>
-          <p:cNvPr id="26" name="TextBox 25"/>
+          <p:cNvPr id="65" name="TextBox 64"/>
           <p:cNvSpPr txBox="1">
             <a:spLocks/>
           </p:cNvSpPr>
@@ -3349,7 +3890,7 @@
         </p:nvSpPr>
         <p:spPr>
           <a:xfrm>
-            <a:off x="3157200" y="5587735"/>
+            <a:off x="2970482" y="5639725"/>
             <a:ext cx="1891826" cy="1143000"/>
           </a:xfrm>
           <a:prstGeom prst="roundRect">
@@ -3372,187 +3913,22 @@
                   <a:schemeClr val="bg1"/>
                 </a:solidFill>
               </a:rPr>
-              <a:t>END</a:t>
-            </a:r>
-          </a:p>
-        </p:txBody>
-      </p:sp>
-      <p:sp>
-        <p:nvSpPr>
-          <p:cNvPr id="47" name="TextBox 46"/>
+              <a:t>START</a:t>
+            </a:r>
+          </a:p>
+        </p:txBody>
+      </p:sp>
+      <p:sp>
+        <p:nvSpPr>
+          <p:cNvPr id="72" name="TextBox 71"/>
           <p:cNvSpPr txBox="1">
             <a:spLocks/>
           </p:cNvSpPr>
           <p:nvPr/>
         </p:nvSpPr>
         <p:spPr>
-          <a:xfrm flipH="1">
-            <a:off x="5525872" y="1196373"/>
-            <a:ext cx="1543679" cy="460787"/>
-          </a:xfrm>
-          <a:prstGeom prst="rightArrow">
-            <a:avLst>
-              <a:gd name="adj1" fmla="val 50000"/>
-              <a:gd name="adj2" fmla="val 37112"/>
-            </a:avLst>
-          </a:prstGeom>
-          <a:solidFill>
-            <a:schemeClr val="tx1"/>
-          </a:solidFill>
-        </p:spPr>
-        <p:txBody>
-          <a:bodyPr wrap="square" rtlCol="0" anchor="ctr" anchorCtr="1">
-            <a:noAutofit/>
-          </a:bodyPr>
-          <a:lstStyle/>
-          <a:p>
-            <a:pPr algn="ctr">
-              <a:lnSpc>
-                <a:spcPct val="60000"/>
-              </a:lnSpc>
-            </a:pPr>
-            <a:r>
-              <a:rPr lang="en-US" sz="1400" dirty="0" smtClean="0">
-                <a:solidFill>
-                  <a:schemeClr val="bg1"/>
-                </a:solidFill>
-              </a:rPr>
-              <a:t>WAIT FOR MOVE</a:t>
-            </a:r>
-            <a:endParaRPr lang="en-US" dirty="0" smtClean="0">
-              <a:solidFill>
-                <a:schemeClr val="bg1"/>
-              </a:solidFill>
-            </a:endParaRPr>
-          </a:p>
-        </p:txBody>
-      </p:sp>
-      <p:sp>
-        <p:nvSpPr>
-          <p:cNvPr id="48" name="TextBox 47"/>
-          <p:cNvSpPr txBox="1">
-            <a:spLocks/>
-          </p:cNvSpPr>
-          <p:nvPr/>
-        </p:nvSpPr>
-        <p:spPr>
-          <a:xfrm rot="5400000">
-            <a:off x="7377235" y="2611369"/>
-            <a:ext cx="1273165" cy="460787"/>
-          </a:xfrm>
-          <a:prstGeom prst="rightArrow">
-            <a:avLst>
-              <a:gd name="adj1" fmla="val 50000"/>
-              <a:gd name="adj2" fmla="val 37112"/>
-            </a:avLst>
-          </a:prstGeom>
-          <a:solidFill>
-            <a:schemeClr val="tx1"/>
-          </a:solidFill>
-        </p:spPr>
-        <p:txBody>
-          <a:bodyPr vert="vert270" wrap="square" rtlCol="0" anchor="ctr" anchorCtr="1">
-            <a:noAutofit/>
-          </a:bodyPr>
-          <a:lstStyle/>
-          <a:p>
-            <a:pPr algn="ctr">
-              <a:lnSpc>
-                <a:spcPct val="60000"/>
-              </a:lnSpc>
-            </a:pPr>
-            <a:r>
-              <a:rPr lang="en-US" sz="1200" dirty="0" smtClean="0">
-                <a:solidFill>
-                  <a:schemeClr val="bg1"/>
-                </a:solidFill>
-              </a:rPr>
-              <a:t>WRONG</a:t>
-            </a:r>
-          </a:p>
-          <a:p>
-            <a:pPr algn="ctr">
-              <a:lnSpc>
-                <a:spcPct val="60000"/>
-              </a:lnSpc>
-            </a:pPr>
-            <a:r>
-              <a:rPr lang="en-US" sz="1200" dirty="0" smtClean="0">
-                <a:solidFill>
-                  <a:schemeClr val="bg1"/>
-                </a:solidFill>
-              </a:rPr>
-              <a:t> MOVE</a:t>
-            </a:r>
-            <a:endParaRPr lang="en-US" sz="1600" dirty="0" smtClean="0">
-              <a:solidFill>
-                <a:schemeClr val="bg1"/>
-              </a:solidFill>
-            </a:endParaRPr>
-          </a:p>
-        </p:txBody>
-      </p:sp>
-      <p:sp>
-        <p:nvSpPr>
-          <p:cNvPr id="49" name="TextBox 48"/>
-          <p:cNvSpPr txBox="1">
-            <a:spLocks/>
-          </p:cNvSpPr>
-          <p:nvPr/>
-        </p:nvSpPr>
-        <p:spPr>
-          <a:xfrm rot="20201506" flipH="1">
-            <a:off x="4860936" y="4893830"/>
-            <a:ext cx="3041236" cy="460787"/>
-          </a:xfrm>
-          <a:prstGeom prst="rightArrow">
-            <a:avLst>
-              <a:gd name="adj1" fmla="val 50000"/>
-              <a:gd name="adj2" fmla="val 37112"/>
-            </a:avLst>
-          </a:prstGeom>
-          <a:solidFill>
-            <a:schemeClr val="tx1"/>
-          </a:solidFill>
-        </p:spPr>
-        <p:txBody>
-          <a:bodyPr wrap="square" rtlCol="0" anchor="ctr" anchorCtr="1">
-            <a:noAutofit/>
-          </a:bodyPr>
-          <a:lstStyle/>
-          <a:p>
-            <a:pPr algn="ctr">
-              <a:lnSpc>
-                <a:spcPct val="60000"/>
-              </a:lnSpc>
-            </a:pPr>
-            <a:r>
-              <a:rPr lang="en-US" sz="1400" dirty="0" smtClean="0">
-                <a:solidFill>
-                  <a:schemeClr val="bg1"/>
-                </a:solidFill>
-              </a:rPr>
-              <a:t>END GAME</a:t>
-            </a:r>
-            <a:endParaRPr lang="en-US" dirty="0" smtClean="0">
-              <a:solidFill>
-                <a:schemeClr val="bg1"/>
-              </a:solidFill>
-            </a:endParaRPr>
-          </a:p>
-        </p:txBody>
-      </p:sp>
-      <p:sp>
-        <p:nvSpPr>
-          <p:cNvPr id="25" name="TextBox 24"/>
-          <p:cNvSpPr txBox="1">
-            <a:spLocks/>
-          </p:cNvSpPr>
-          <p:nvPr/>
-        </p:nvSpPr>
-        <p:spPr>
-          <a:xfrm>
-            <a:off x="7065000" y="3478344"/>
+          <a:xfrm>
+            <a:off x="216945" y="5639725"/>
             <a:ext cx="1891826" cy="1143000"/>
           </a:xfrm>
           <a:prstGeom prst="roundRect">
@@ -3575,702 +3951,1045 @@
                   <a:schemeClr val="bg1"/>
                 </a:solidFill>
               </a:rPr>
-              <a:t>POPUP CONTINUE</a:t>
-            </a:r>
-          </a:p>
-        </p:txBody>
-      </p:sp>
-      <p:sp>
-        <p:nvSpPr>
-          <p:cNvPr id="50" name="TextBox 49"/>
-          <p:cNvSpPr txBox="1">
-            <a:spLocks/>
-          </p:cNvSpPr>
+              <a:t>LOADING</a:t>
+            </a:r>
+          </a:p>
+        </p:txBody>
+      </p:sp>
+      <p:cxnSp>
+        <p:nvCxnSpPr>
+          <p:cNvPr id="76" name="Straight Arrow Connector 75"/>
+          <p:cNvCxnSpPr>
+            <a:stCxn id="72" idx="3"/>
+            <a:endCxn id="65" idx="1"/>
+          </p:cNvCxnSpPr>
           <p:nvPr/>
-        </p:nvSpPr>
-        <p:spPr>
-          <a:xfrm flipH="1">
-            <a:off x="5994939" y="3661414"/>
-            <a:ext cx="1074607" cy="649544"/>
-          </a:xfrm>
-          <a:prstGeom prst="rightArrow">
+        </p:nvCxnSpPr>
+        <p:spPr>
+          <a:xfrm>
+            <a:off x="2108771" y="6211225"/>
+            <a:ext cx="861711" cy="0"/>
+          </a:xfrm>
+          <a:prstGeom prst="straightConnector1">
+            <a:avLst/>
+          </a:prstGeom>
+          <a:ln>
+            <a:tailEnd type="arrow"/>
+          </a:ln>
+        </p:spPr>
+        <p:style>
+          <a:lnRef idx="2">
+            <a:schemeClr val="accent1"/>
+          </a:lnRef>
+          <a:fillRef idx="0">
+            <a:schemeClr val="accent1"/>
+          </a:fillRef>
+          <a:effectRef idx="1">
+            <a:schemeClr val="accent1"/>
+          </a:effectRef>
+          <a:fontRef idx="minor">
+            <a:schemeClr val="tx1"/>
+          </a:fontRef>
+        </p:style>
+      </p:cxnSp>
+      <p:cxnSp>
+        <p:nvCxnSpPr>
+          <p:cNvPr id="181" name="Curved Connector 180"/>
+          <p:cNvCxnSpPr>
+            <a:stCxn id="24" idx="2"/>
+            <a:endCxn id="207" idx="0"/>
+          </p:cNvCxnSpPr>
+          <p:nvPr/>
+        </p:nvCxnSpPr>
+        <p:spPr>
+          <a:xfrm rot="5400000">
+            <a:off x="4091362" y="2384802"/>
+            <a:ext cx="1063360" cy="270840"/>
+          </a:xfrm>
+          <a:prstGeom prst="curvedConnector3">
             <a:avLst>
               <a:gd name="adj1" fmla="val 50000"/>
-              <a:gd name="adj2" fmla="val 37112"/>
             </a:avLst>
           </a:prstGeom>
-          <a:solidFill>
+          <a:ln w="57150" cmpd="sng">
+            <a:headEnd type="triangle"/>
+            <a:tailEnd type="triangle"/>
+          </a:ln>
+        </p:spPr>
+        <p:style>
+          <a:lnRef idx="3">
+            <a:schemeClr val="accent1"/>
+          </a:lnRef>
+          <a:fillRef idx="0">
+            <a:schemeClr val="accent1"/>
+          </a:fillRef>
+          <a:effectRef idx="2">
+            <a:schemeClr val="accent1"/>
+          </a:effectRef>
+          <a:fontRef idx="minor">
             <a:schemeClr val="tx1"/>
-          </a:solidFill>
-        </p:spPr>
-        <p:txBody>
-          <a:bodyPr wrap="square" rtlCol="0" anchor="ctr" anchorCtr="1">
-            <a:noAutofit/>
-          </a:bodyPr>
-          <a:lstStyle/>
-          <a:p>
-            <a:pPr algn="ctr">
-              <a:lnSpc>
-                <a:spcPct val="60000"/>
-              </a:lnSpc>
-            </a:pPr>
-            <a:r>
-              <a:rPr lang="en-US" sz="1400" dirty="0" smtClean="0">
-                <a:solidFill>
-                  <a:schemeClr val="bg1"/>
-                </a:solidFill>
-              </a:rPr>
-              <a:t>PAY FOR CONTINUE</a:t>
-            </a:r>
-            <a:endParaRPr lang="en-US" dirty="0" smtClean="0">
-              <a:solidFill>
-                <a:schemeClr val="bg1"/>
-              </a:solidFill>
-            </a:endParaRPr>
-          </a:p>
-        </p:txBody>
-      </p:sp>
-      <p:sp>
-        <p:nvSpPr>
-          <p:cNvPr id="51" name="TextBox 50"/>
-          <p:cNvSpPr txBox="1">
-            <a:spLocks/>
-          </p:cNvSpPr>
+          </a:fontRef>
+        </p:style>
+      </p:cxnSp>
+      <p:cxnSp>
+        <p:nvCxnSpPr>
+          <p:cNvPr id="195" name="Curved Connector 194"/>
+          <p:cNvCxnSpPr>
+            <a:stCxn id="17" idx="3"/>
+            <a:endCxn id="207" idx="2"/>
+          </p:cNvCxnSpPr>
           <p:nvPr/>
-        </p:nvSpPr>
-        <p:spPr>
-          <a:xfrm rot="5400000" flipH="1">
-            <a:off x="4577789" y="2193216"/>
-            <a:ext cx="1273164" cy="1297094"/>
-          </a:xfrm>
-          <a:prstGeom prst="rightArrow">
+        </p:nvCxnSpPr>
+        <p:spPr>
+          <a:xfrm>
+            <a:off x="2108771" y="1417042"/>
+            <a:ext cx="1703778" cy="2309933"/>
+          </a:xfrm>
+          <a:prstGeom prst="curvedConnector3">
             <a:avLst>
               <a:gd name="adj1" fmla="val 50000"/>
-              <a:gd name="adj2" fmla="val 37112"/>
             </a:avLst>
           </a:prstGeom>
-          <a:solidFill>
+          <a:ln w="57150" cmpd="sng">
+            <a:headEnd type="triangle"/>
+            <a:tailEnd type="triangle"/>
+          </a:ln>
+        </p:spPr>
+        <p:style>
+          <a:lnRef idx="3">
+            <a:schemeClr val="accent1"/>
+          </a:lnRef>
+          <a:fillRef idx="0">
+            <a:schemeClr val="accent1"/>
+          </a:fillRef>
+          <a:effectRef idx="2">
+            <a:schemeClr val="accent1"/>
+          </a:effectRef>
+          <a:fontRef idx="minor">
             <a:schemeClr val="tx1"/>
-          </a:solidFill>
-        </p:spPr>
-        <p:txBody>
-          <a:bodyPr vert="vert270" wrap="square" rtlCol="0" anchor="ctr" anchorCtr="1">
-            <a:noAutofit/>
-          </a:bodyPr>
-          <a:lstStyle/>
-          <a:p>
-            <a:pPr algn="ctr">
-              <a:lnSpc>
-                <a:spcPct val="60000"/>
-              </a:lnSpc>
-            </a:pPr>
-            <a:r>
-              <a:rPr lang="en-US" sz="1400" dirty="0" smtClean="0">
-                <a:solidFill>
-                  <a:schemeClr val="bg1"/>
-                </a:solidFill>
-              </a:rPr>
-              <a:t>WAIT FOR MOVE</a:t>
-            </a:r>
-            <a:endParaRPr lang="en-US" dirty="0" smtClean="0">
-              <a:solidFill>
-                <a:schemeClr val="bg1"/>
-              </a:solidFill>
-            </a:endParaRPr>
-          </a:p>
-        </p:txBody>
-      </p:sp>
-      <p:sp>
-        <p:nvSpPr>
-          <p:cNvPr id="52" name="TextBox 51"/>
-          <p:cNvSpPr txBox="1">
-            <a:spLocks/>
-          </p:cNvSpPr>
+          </a:fontRef>
+        </p:style>
+      </p:cxnSp>
+      <p:cxnSp>
+        <p:nvCxnSpPr>
+          <p:cNvPr id="199" name="Straight Arrow Connector 198"/>
+          <p:cNvCxnSpPr>
+            <a:stCxn id="24" idx="3"/>
+            <a:endCxn id="25" idx="1"/>
+          </p:cNvCxnSpPr>
           <p:nvPr/>
-        </p:nvSpPr>
+        </p:nvCxnSpPr>
+        <p:spPr>
+          <a:xfrm flipV="1">
+            <a:off x="5704375" y="1417040"/>
+            <a:ext cx="1090599" cy="2"/>
+          </a:xfrm>
+          <a:prstGeom prst="straightConnector1">
+            <a:avLst/>
+          </a:prstGeom>
+          <a:ln>
+            <a:tailEnd type="arrow"/>
+          </a:ln>
+        </p:spPr>
+        <p:style>
+          <a:lnRef idx="2">
+            <a:schemeClr val="accent1"/>
+          </a:lnRef>
+          <a:fillRef idx="0">
+            <a:schemeClr val="accent1"/>
+          </a:fillRef>
+          <a:effectRef idx="1">
+            <a:schemeClr val="accent1"/>
+          </a:effectRef>
+          <a:fontRef idx="minor">
+            <a:schemeClr val="tx1"/>
+          </a:fontRef>
+        </p:style>
+      </p:cxnSp>
+      <p:cxnSp>
+        <p:nvCxnSpPr>
+          <p:cNvPr id="202" name="Curved Connector 201"/>
+          <p:cNvCxnSpPr>
+            <a:stCxn id="207" idx="3"/>
+            <a:endCxn id="21" idx="3"/>
+          </p:cNvCxnSpPr>
+          <p:nvPr/>
+        </p:nvCxnSpPr>
+        <p:spPr>
+          <a:xfrm rot="5400000" flipH="1">
+            <a:off x="2994048" y="3188099"/>
+            <a:ext cx="130950" cy="1901501"/>
+          </a:xfrm>
+          <a:prstGeom prst="curvedConnector4">
+            <a:avLst>
+              <a:gd name="adj1" fmla="val -174570"/>
+              <a:gd name="adj2" fmla="val 55199"/>
+            </a:avLst>
+          </a:prstGeom>
+          <a:ln w="57150" cmpd="sng">
+            <a:headEnd type="triangle"/>
+            <a:tailEnd type="triangle"/>
+          </a:ln>
+        </p:spPr>
+        <p:style>
+          <a:lnRef idx="3">
+            <a:schemeClr val="accent1"/>
+          </a:lnRef>
+          <a:fillRef idx="0">
+            <a:schemeClr val="accent1"/>
+          </a:fillRef>
+          <a:effectRef idx="2">
+            <a:schemeClr val="accent1"/>
+          </a:effectRef>
+          <a:fontRef idx="minor">
+            <a:schemeClr val="tx1"/>
+          </a:fontRef>
+        </p:style>
+      </p:cxnSp>
+      <p:sp>
+        <p:nvSpPr>
+          <p:cNvPr id="207" name="Connector 206"/>
+          <p:cNvSpPr/>
+          <p:nvPr/>
+        </p:nvSpPr>
+        <p:spPr>
+          <a:xfrm>
+            <a:off x="3812549" y="3051902"/>
+            <a:ext cx="1350146" cy="1350146"/>
+          </a:xfrm>
+          <a:prstGeom prst="flowChartConnector">
+            <a:avLst/>
+          </a:prstGeom>
+        </p:spPr>
+        <p:style>
+          <a:lnRef idx="1">
+            <a:schemeClr val="accent1"/>
+          </a:lnRef>
+          <a:fillRef idx="3">
+            <a:schemeClr val="accent1"/>
+          </a:fillRef>
+          <a:effectRef idx="2">
+            <a:schemeClr val="accent1"/>
+          </a:effectRef>
+          <a:fontRef idx="minor">
+            <a:schemeClr val="lt1"/>
+          </a:fontRef>
+        </p:style>
+        <p:txBody>
+          <a:bodyPr rtlCol="0" anchor="ctr"/>
+          <a:lstStyle/>
+          <a:p>
+            <a:pPr algn="ctr"/>
+            <a:r>
+              <a:rPr lang="en-US" dirty="0" smtClean="0"/>
+              <a:t>IDLE</a:t>
+            </a:r>
+            <a:endParaRPr lang="en-US" dirty="0"/>
+          </a:p>
+        </p:txBody>
+      </p:sp>
+      <p:cxnSp>
+        <p:nvCxnSpPr>
+          <p:cNvPr id="218" name="Straight Arrow Connector 217"/>
+          <p:cNvCxnSpPr>
+            <a:stCxn id="25" idx="2"/>
+            <a:endCxn id="22" idx="0"/>
+          </p:cNvCxnSpPr>
+          <p:nvPr/>
+        </p:nvCxnSpPr>
         <p:spPr>
           <a:xfrm flipH="1">
-            <a:off x="2108769" y="1539631"/>
-            <a:ext cx="1525275" cy="665549"/>
-          </a:xfrm>
-          <a:prstGeom prst="rightArrow">
+            <a:off x="7023789" y="1988540"/>
+            <a:ext cx="717098" cy="1166935"/>
+          </a:xfrm>
+          <a:prstGeom prst="straightConnector1">
+            <a:avLst/>
+          </a:prstGeom>
+          <a:ln>
+            <a:tailEnd type="arrow"/>
+          </a:ln>
+        </p:spPr>
+        <p:style>
+          <a:lnRef idx="2">
+            <a:schemeClr val="accent1"/>
+          </a:lnRef>
+          <a:fillRef idx="0">
+            <a:schemeClr val="accent1"/>
+          </a:fillRef>
+          <a:effectRef idx="1">
+            <a:schemeClr val="accent1"/>
+          </a:effectRef>
+          <a:fontRef idx="minor">
+            <a:schemeClr val="tx1"/>
+          </a:fontRef>
+        </p:style>
+      </p:cxnSp>
+      <p:cxnSp>
+        <p:nvCxnSpPr>
+          <p:cNvPr id="221" name="Straight Arrow Connector 220"/>
+          <p:cNvCxnSpPr>
+            <a:stCxn id="22" idx="1"/>
+            <a:endCxn id="207" idx="6"/>
+          </p:cNvCxnSpPr>
+          <p:nvPr/>
+        </p:nvCxnSpPr>
+        <p:spPr>
+          <a:xfrm flipH="1">
+            <a:off x="5162695" y="3726975"/>
+            <a:ext cx="915181" cy="0"/>
+          </a:xfrm>
+          <a:prstGeom prst="straightConnector1">
+            <a:avLst/>
+          </a:prstGeom>
+          <a:ln>
+            <a:tailEnd type="arrow"/>
+          </a:ln>
+        </p:spPr>
+        <p:style>
+          <a:lnRef idx="2">
+            <a:schemeClr val="accent1"/>
+          </a:lnRef>
+          <a:fillRef idx="0">
+            <a:schemeClr val="accent1"/>
+          </a:fillRef>
+          <a:effectRef idx="1">
+            <a:schemeClr val="accent1"/>
+          </a:effectRef>
+          <a:fontRef idx="minor">
+            <a:schemeClr val="tx1"/>
+          </a:fontRef>
+        </p:style>
+      </p:cxnSp>
+      <p:cxnSp>
+        <p:nvCxnSpPr>
+          <p:cNvPr id="241" name="Curved Connector 240"/>
+          <p:cNvCxnSpPr>
+            <a:stCxn id="25" idx="3"/>
+            <a:endCxn id="26" idx="3"/>
+          </p:cNvCxnSpPr>
+          <p:nvPr/>
+        </p:nvCxnSpPr>
+        <p:spPr>
+          <a:xfrm flipH="1">
+            <a:off x="8198954" y="1417040"/>
+            <a:ext cx="487846" cy="4415750"/>
+          </a:xfrm>
+          <a:prstGeom prst="curvedConnector3">
+            <a:avLst>
+              <a:gd name="adj1" fmla="val -46859"/>
+            </a:avLst>
+          </a:prstGeom>
+          <a:ln>
+            <a:tailEnd type="arrow"/>
+          </a:ln>
+        </p:spPr>
+        <p:style>
+          <a:lnRef idx="2">
+            <a:schemeClr val="accent1"/>
+          </a:lnRef>
+          <a:fillRef idx="0">
+            <a:schemeClr val="accent1"/>
+          </a:fillRef>
+          <a:effectRef idx="1">
+            <a:schemeClr val="accent1"/>
+          </a:effectRef>
+          <a:fontRef idx="minor">
+            <a:schemeClr val="tx1"/>
+          </a:fontRef>
+        </p:style>
+      </p:cxnSp>
+      <p:cxnSp>
+        <p:nvCxnSpPr>
+          <p:cNvPr id="242" name="Curved Connector 241"/>
+          <p:cNvCxnSpPr>
+            <a:stCxn id="26" idx="1"/>
+            <a:endCxn id="65" idx="3"/>
+          </p:cNvCxnSpPr>
+          <p:nvPr/>
+        </p:nvCxnSpPr>
+        <p:spPr>
+          <a:xfrm rot="10800000" flipV="1">
+            <a:off x="4862308" y="5832789"/>
+            <a:ext cx="1444820" cy="378435"/>
+          </a:xfrm>
+          <a:prstGeom prst="curvedConnector3">
             <a:avLst>
               <a:gd name="adj1" fmla="val 50000"/>
-              <a:gd name="adj2" fmla="val 37112"/>
             </a:avLst>
           </a:prstGeom>
-          <a:solidFill>
+          <a:ln>
+            <a:tailEnd type="arrow"/>
+          </a:ln>
+        </p:spPr>
+        <p:style>
+          <a:lnRef idx="2">
+            <a:schemeClr val="accent1"/>
+          </a:lnRef>
+          <a:fillRef idx="0">
+            <a:schemeClr val="accent1"/>
+          </a:fillRef>
+          <a:effectRef idx="1">
+            <a:schemeClr val="accent1"/>
+          </a:effectRef>
+          <a:fontRef idx="minor">
             <a:schemeClr val="tx1"/>
-          </a:solidFill>
-        </p:spPr>
-        <p:txBody>
-          <a:bodyPr wrap="square" rtlCol="0" anchor="ctr" anchorCtr="1">
-            <a:noAutofit/>
-          </a:bodyPr>
-          <a:lstStyle/>
-          <a:p>
-            <a:pPr algn="ctr">
-              <a:lnSpc>
-                <a:spcPct val="60000"/>
-              </a:lnSpc>
-            </a:pPr>
-            <a:r>
-              <a:rPr lang="en-US" sz="1400" dirty="0" smtClean="0">
-                <a:solidFill>
-                  <a:schemeClr val="bg1"/>
-                </a:solidFill>
-              </a:rPr>
-              <a:t>START FALLING MONKEY</a:t>
-            </a:r>
-            <a:endParaRPr lang="en-US" dirty="0" smtClean="0">
-              <a:solidFill>
-                <a:schemeClr val="bg1"/>
-              </a:solidFill>
-            </a:endParaRPr>
-          </a:p>
-        </p:txBody>
-      </p:sp>
-      <p:sp>
-        <p:nvSpPr>
-          <p:cNvPr id="53" name="TextBox 52"/>
-          <p:cNvSpPr txBox="1">
-            <a:spLocks/>
-          </p:cNvSpPr>
+          </a:fontRef>
+        </p:style>
+      </p:cxnSp>
+      <p:cxnSp>
+        <p:nvCxnSpPr>
+          <p:cNvPr id="245" name="Curved Connector 244"/>
+          <p:cNvCxnSpPr>
+            <a:stCxn id="65" idx="0"/>
+            <a:endCxn id="207" idx="4"/>
+          </p:cNvCxnSpPr>
           <p:nvPr/>
-        </p:nvSpPr>
-        <p:spPr>
-          <a:xfrm>
-            <a:off x="2108769" y="1094588"/>
-            <a:ext cx="1543679" cy="460787"/>
-          </a:xfrm>
-          <a:prstGeom prst="rightArrow">
+        </p:nvCxnSpPr>
+        <p:spPr>
+          <a:xfrm rot="5400000" flipH="1" flipV="1">
+            <a:off x="3583170" y="4735274"/>
+            <a:ext cx="1237677" cy="571227"/>
+          </a:xfrm>
+          <a:prstGeom prst="curvedConnector3">
             <a:avLst>
               <a:gd name="adj1" fmla="val 50000"/>
-              <a:gd name="adj2" fmla="val 37112"/>
             </a:avLst>
           </a:prstGeom>
-          <a:solidFill>
+          <a:ln>
+            <a:tailEnd type="arrow"/>
+          </a:ln>
+        </p:spPr>
+        <p:style>
+          <a:lnRef idx="2">
+            <a:schemeClr val="accent1"/>
+          </a:lnRef>
+          <a:fillRef idx="0">
+            <a:schemeClr val="accent1"/>
+          </a:fillRef>
+          <a:effectRef idx="1">
+            <a:schemeClr val="accent1"/>
+          </a:effectRef>
+          <a:fontRef idx="minor">
             <a:schemeClr val="tx1"/>
-          </a:solidFill>
-        </p:spPr>
-        <p:txBody>
-          <a:bodyPr wrap="square" rtlCol="0" anchor="ctr" anchorCtr="1">
-            <a:noAutofit/>
+          </a:fontRef>
+        </p:style>
+      </p:cxnSp>
+      <p:sp>
+        <p:nvSpPr>
+          <p:cNvPr id="248" name="TextBox 247"/>
+          <p:cNvSpPr txBox="1"/>
+          <p:nvPr/>
+        </p:nvSpPr>
+        <p:spPr>
+          <a:xfrm>
+            <a:off x="2227558" y="4113809"/>
+            <a:ext cx="742924" cy="369332"/>
+          </a:xfrm>
+          <a:prstGeom prst="rect">
+            <a:avLst/>
+          </a:prstGeom>
+          <a:noFill/>
+        </p:spPr>
+        <p:txBody>
+          <a:bodyPr wrap="none" rtlCol="0">
+            <a:spAutoFit/>
           </a:bodyPr>
           <a:lstStyle/>
           <a:p>
-            <a:pPr algn="ctr">
-              <a:lnSpc>
-                <a:spcPct val="60000"/>
-              </a:lnSpc>
-            </a:pPr>
-            <a:r>
-              <a:rPr lang="en-US" sz="1400" dirty="0" smtClean="0">
-                <a:solidFill>
-                  <a:schemeClr val="bg1"/>
-                </a:solidFill>
-              </a:rPr>
-              <a:t>WAIT FOR MOVE</a:t>
-            </a:r>
-            <a:endParaRPr lang="en-US" dirty="0" smtClean="0">
-              <a:solidFill>
-                <a:schemeClr val="bg1"/>
-              </a:solidFill>
-            </a:endParaRPr>
-          </a:p>
-        </p:txBody>
-      </p:sp>
-      <p:sp>
-        <p:nvSpPr>
-          <p:cNvPr id="55" name="TextBox 54"/>
-          <p:cNvSpPr txBox="1">
-            <a:spLocks/>
-          </p:cNvSpPr>
+            <a:r>
+              <a:rPr lang="en-US" dirty="0" smtClean="0"/>
+              <a:t>pause</a:t>
+            </a:r>
+            <a:endParaRPr lang="en-US" dirty="0"/>
+          </a:p>
+        </p:txBody>
+      </p:sp>
+      <p:sp>
+        <p:nvSpPr>
+          <p:cNvPr id="249" name="TextBox 248"/>
+          <p:cNvSpPr txBox="1"/>
           <p:nvPr/>
         </p:nvSpPr>
         <p:spPr>
-          <a:xfrm rot="8752890" flipH="1" flipV="1">
-            <a:off x="1660873" y="2819776"/>
-            <a:ext cx="2730858" cy="460787"/>
-          </a:xfrm>
-          <a:prstGeom prst="rightArrow">
+          <a:xfrm>
+            <a:off x="411474" y="4891958"/>
+            <a:ext cx="591215" cy="369332"/>
+          </a:xfrm>
+          <a:prstGeom prst="rect">
+            <a:avLst/>
+          </a:prstGeom>
+          <a:noFill/>
+        </p:spPr>
+        <p:txBody>
+          <a:bodyPr wrap="none" rtlCol="0">
+            <a:spAutoFit/>
+          </a:bodyPr>
+          <a:lstStyle/>
+          <a:p>
+            <a:r>
+              <a:rPr lang="en-US" dirty="0" smtClean="0"/>
+              <a:t>load</a:t>
+            </a:r>
+            <a:endParaRPr lang="en-US" dirty="0"/>
+          </a:p>
+        </p:txBody>
+      </p:sp>
+      <p:cxnSp>
+        <p:nvCxnSpPr>
+          <p:cNvPr id="253" name="Curved Connector 252"/>
+          <p:cNvCxnSpPr>
+            <a:stCxn id="21" idx="2"/>
+            <a:endCxn id="26" idx="0"/>
+          </p:cNvCxnSpPr>
+          <p:nvPr/>
+        </p:nvCxnSpPr>
+        <p:spPr>
+          <a:xfrm rot="16200000" flipH="1">
+            <a:off x="3899742" y="1907991"/>
+            <a:ext cx="616416" cy="6090182"/>
+          </a:xfrm>
+          <a:prstGeom prst="curvedConnector3">
             <a:avLst>
               <a:gd name="adj1" fmla="val 50000"/>
-              <a:gd name="adj2" fmla="val 37112"/>
             </a:avLst>
           </a:prstGeom>
-          <a:solidFill>
+          <a:ln>
+            <a:tailEnd type="arrow"/>
+          </a:ln>
+        </p:spPr>
+        <p:style>
+          <a:lnRef idx="2">
+            <a:schemeClr val="accent1"/>
+          </a:lnRef>
+          <a:fillRef idx="0">
+            <a:schemeClr val="accent1"/>
+          </a:fillRef>
+          <a:effectRef idx="1">
+            <a:schemeClr val="accent1"/>
+          </a:effectRef>
+          <a:fontRef idx="minor">
             <a:schemeClr val="tx1"/>
-          </a:solidFill>
-        </p:spPr>
-        <p:txBody>
-          <a:bodyPr wrap="square" rtlCol="0" anchor="ctr" anchorCtr="1">
-            <a:noAutofit/>
+          </a:fontRef>
+        </p:style>
+      </p:cxnSp>
+      <p:sp>
+        <p:nvSpPr>
+          <p:cNvPr id="260" name="TextBox 259"/>
+          <p:cNvSpPr txBox="1"/>
+          <p:nvPr/>
+        </p:nvSpPr>
+        <p:spPr>
+          <a:xfrm>
+            <a:off x="2108771" y="1109263"/>
+            <a:ext cx="1323197" cy="261610"/>
+          </a:xfrm>
+          <a:prstGeom prst="rect">
+            <a:avLst/>
+          </a:prstGeom>
+          <a:noFill/>
+        </p:spPr>
+        <p:txBody>
+          <a:bodyPr wrap="square" rtlCol="0">
+            <a:spAutoFit/>
           </a:bodyPr>
           <a:lstStyle/>
           <a:p>
-            <a:pPr algn="ctr">
-              <a:lnSpc>
-                <a:spcPct val="60000"/>
-              </a:lnSpc>
-            </a:pPr>
-            <a:r>
-              <a:rPr lang="en-US" sz="1400" dirty="0" smtClean="0">
-                <a:solidFill>
-                  <a:schemeClr val="bg1"/>
-                </a:solidFill>
-              </a:rPr>
-              <a:t>WAIT FOR MOVE</a:t>
-            </a:r>
-            <a:endParaRPr lang="en-US" dirty="0" smtClean="0">
-              <a:solidFill>
-                <a:schemeClr val="bg1"/>
-              </a:solidFill>
-            </a:endParaRPr>
-          </a:p>
-        </p:txBody>
-      </p:sp>
-      <p:sp>
-        <p:nvSpPr>
-          <p:cNvPr id="56" name="TextBox 55"/>
-          <p:cNvSpPr txBox="1">
-            <a:spLocks/>
-          </p:cNvSpPr>
+            <a:r>
+              <a:rPr lang="en-US" sz="1100" dirty="0" err="1" smtClean="0"/>
+              <a:t>fallingMonkeyStart</a:t>
+            </a:r>
+            <a:endParaRPr lang="en-US" sz="1100" dirty="0" smtClean="0"/>
+          </a:p>
+        </p:txBody>
+      </p:sp>
+      <p:sp>
+        <p:nvSpPr>
+          <p:cNvPr id="264" name="TextBox 263"/>
+          <p:cNvSpPr txBox="1"/>
           <p:nvPr/>
         </p:nvSpPr>
         <p:spPr>
-          <a:xfrm rot="2050607">
-            <a:off x="1025123" y="4832676"/>
-            <a:ext cx="2434584" cy="460787"/>
-          </a:xfrm>
-          <a:prstGeom prst="rightArrow">
-            <a:avLst>
-              <a:gd name="adj1" fmla="val 50000"/>
-              <a:gd name="adj2" fmla="val 37112"/>
-            </a:avLst>
-          </a:prstGeom>
-          <a:solidFill>
+          <a:xfrm>
+            <a:off x="4869275" y="2055414"/>
+            <a:ext cx="1426274" cy="307777"/>
+          </a:xfrm>
+          <a:prstGeom prst="rect">
+            <a:avLst/>
+          </a:prstGeom>
+          <a:noFill/>
+        </p:spPr>
+        <p:txBody>
+          <a:bodyPr wrap="square" rtlCol="0">
+            <a:spAutoFit/>
+          </a:bodyPr>
+          <a:lstStyle/>
+          <a:p>
+            <a:r>
+              <a:rPr lang="en-US" sz="1400" dirty="0" err="1" smtClean="0"/>
+              <a:t>moveEntered</a:t>
+            </a:r>
+            <a:endParaRPr lang="en-US" sz="1400" dirty="0" smtClean="0"/>
+          </a:p>
+        </p:txBody>
+      </p:sp>
+      <p:sp>
+        <p:nvSpPr>
+          <p:cNvPr id="269" name="TextBox 268"/>
+          <p:cNvSpPr txBox="1"/>
+          <p:nvPr/>
+        </p:nvSpPr>
+        <p:spPr>
+          <a:xfrm>
+            <a:off x="5649108" y="1151081"/>
+            <a:ext cx="1292881" cy="253916"/>
+          </a:xfrm>
+          <a:prstGeom prst="rect">
+            <a:avLst/>
+          </a:prstGeom>
+          <a:noFill/>
+        </p:spPr>
+        <p:txBody>
+          <a:bodyPr wrap="square" rtlCol="0">
+            <a:spAutoFit/>
+          </a:bodyPr>
+          <a:lstStyle/>
+          <a:p>
+            <a:r>
+              <a:rPr lang="en-US" sz="1000" dirty="0" err="1" smtClean="0"/>
+              <a:t>wrongMoveEntered</a:t>
+            </a:r>
+            <a:endParaRPr lang="en-US" sz="1000" dirty="0"/>
+          </a:p>
+        </p:txBody>
+      </p:sp>
+      <p:sp>
+        <p:nvSpPr>
+          <p:cNvPr id="271" name="TextBox 270"/>
+          <p:cNvSpPr txBox="1"/>
+          <p:nvPr/>
+        </p:nvSpPr>
+        <p:spPr>
+          <a:xfrm>
+            <a:off x="7128618" y="2878476"/>
+            <a:ext cx="1224537" cy="246221"/>
+          </a:xfrm>
+          <a:prstGeom prst="rect">
+            <a:avLst/>
+          </a:prstGeom>
+          <a:noFill/>
+        </p:spPr>
+        <p:txBody>
+          <a:bodyPr wrap="square" rtlCol="0">
+            <a:spAutoFit/>
+          </a:bodyPr>
+          <a:lstStyle/>
+          <a:p>
+            <a:r>
+              <a:rPr lang="en-US" sz="1000" dirty="0" err="1" smtClean="0"/>
+              <a:t>payForContinue</a:t>
+            </a:r>
+            <a:endParaRPr lang="en-US" sz="1000" dirty="0" smtClean="0"/>
+          </a:p>
+        </p:txBody>
+      </p:sp>
+      <p:cxnSp>
+        <p:nvCxnSpPr>
+          <p:cNvPr id="277" name="Straight Arrow Connector 276"/>
+          <p:cNvCxnSpPr>
+            <a:stCxn id="26" idx="0"/>
+            <a:endCxn id="207" idx="5"/>
+          </p:cNvCxnSpPr>
+          <p:nvPr/>
+        </p:nvCxnSpPr>
+        <p:spPr>
+          <a:xfrm flipH="1" flipV="1">
+            <a:off x="4964971" y="4204324"/>
+            <a:ext cx="2288070" cy="1056966"/>
+          </a:xfrm>
+          <a:prstGeom prst="straightConnector1">
+            <a:avLst/>
+          </a:prstGeom>
+          <a:ln>
+            <a:tailEnd type="arrow"/>
+          </a:ln>
+        </p:spPr>
+        <p:style>
+          <a:lnRef idx="2">
+            <a:schemeClr val="accent1"/>
+          </a:lnRef>
+          <a:fillRef idx="0">
+            <a:schemeClr val="accent1"/>
+          </a:fillRef>
+          <a:effectRef idx="1">
+            <a:schemeClr val="accent1"/>
+          </a:effectRef>
+          <a:fontRef idx="minor">
             <a:schemeClr val="tx1"/>
-          </a:solidFill>
-        </p:spPr>
-        <p:txBody>
-          <a:bodyPr wrap="square" rtlCol="0" anchor="ctr" anchorCtr="1">
-            <a:noAutofit/>
+          </a:fontRef>
+        </p:style>
+      </p:cxnSp>
+      <p:cxnSp>
+        <p:nvCxnSpPr>
+          <p:cNvPr id="279" name="Straight Arrow Connector 278"/>
+          <p:cNvCxnSpPr>
+            <a:endCxn id="72" idx="0"/>
+          </p:cNvCxnSpPr>
+          <p:nvPr/>
+        </p:nvCxnSpPr>
+        <p:spPr>
+          <a:xfrm>
+            <a:off x="1029665" y="5068770"/>
+            <a:ext cx="133193" cy="570955"/>
+          </a:xfrm>
+          <a:prstGeom prst="straightConnector1">
+            <a:avLst/>
+          </a:prstGeom>
+          <a:ln>
+            <a:tailEnd type="arrow"/>
+          </a:ln>
+        </p:spPr>
+        <p:style>
+          <a:lnRef idx="2">
+            <a:schemeClr val="accent1"/>
+          </a:lnRef>
+          <a:fillRef idx="0">
+            <a:schemeClr val="accent1"/>
+          </a:fillRef>
+          <a:effectRef idx="1">
+            <a:schemeClr val="accent1"/>
+          </a:effectRef>
+          <a:fontRef idx="minor">
+            <a:schemeClr val="tx1"/>
+          </a:fontRef>
+        </p:style>
+      </p:cxnSp>
+      <p:sp>
+        <p:nvSpPr>
+          <p:cNvPr id="280" name="TextBox 279"/>
+          <p:cNvSpPr txBox="1"/>
+          <p:nvPr/>
+        </p:nvSpPr>
+        <p:spPr>
+          <a:xfrm>
+            <a:off x="566875" y="5715382"/>
+            <a:ext cx="1191965" cy="369332"/>
+          </a:xfrm>
+          <a:prstGeom prst="rect">
+            <a:avLst/>
+          </a:prstGeom>
+          <a:noFill/>
+        </p:spPr>
+        <p:txBody>
+          <a:bodyPr wrap="none" rtlCol="0">
+            <a:spAutoFit/>
           </a:bodyPr>
           <a:lstStyle/>
           <a:p>
-            <a:pPr algn="ctr">
-              <a:lnSpc>
-                <a:spcPct val="60000"/>
-              </a:lnSpc>
-            </a:pPr>
-            <a:r>
-              <a:rPr lang="en-US" sz="1400" dirty="0" smtClean="0">
-                <a:solidFill>
-                  <a:schemeClr val="bg1"/>
-                </a:solidFill>
-              </a:rPr>
-              <a:t>END GAME</a:t>
-            </a:r>
-            <a:endParaRPr lang="en-US" dirty="0" smtClean="0">
-              <a:solidFill>
-                <a:schemeClr val="bg1"/>
-              </a:solidFill>
-            </a:endParaRPr>
-          </a:p>
-        </p:txBody>
-      </p:sp>
-      <p:sp>
-        <p:nvSpPr>
-          <p:cNvPr id="21" name="TextBox 20"/>
-          <p:cNvSpPr txBox="1">
-            <a:spLocks/>
-          </p:cNvSpPr>
+            <a:r>
+              <a:rPr lang="en-US" dirty="0" smtClean="0"/>
+              <a:t>INIT STATE</a:t>
+            </a:r>
+            <a:endParaRPr lang="en-US" dirty="0"/>
+          </a:p>
+        </p:txBody>
+      </p:sp>
+      <p:sp>
+        <p:nvSpPr>
+          <p:cNvPr id="281" name="TextBox 280"/>
+          <p:cNvSpPr txBox="1"/>
           <p:nvPr/>
         </p:nvSpPr>
         <p:spPr>
           <a:xfrm>
-            <a:off x="216945" y="3478344"/>
-            <a:ext cx="1891826" cy="1143000"/>
-          </a:xfrm>
-          <a:prstGeom prst="roundRect">
-            <a:avLst/>
-          </a:prstGeom>
-          <a:solidFill>
-            <a:schemeClr val="accent1"/>
-          </a:solidFill>
-        </p:spPr>
-        <p:txBody>
-          <a:bodyPr wrap="square" rtlCol="0" anchor="ctr" anchorCtr="1">
-            <a:noAutofit/>
+            <a:off x="2108771" y="5945417"/>
+            <a:ext cx="851515" cy="276999"/>
+          </a:xfrm>
+          <a:prstGeom prst="rect">
+            <a:avLst/>
+          </a:prstGeom>
+          <a:noFill/>
+        </p:spPr>
+        <p:txBody>
+          <a:bodyPr wrap="none" rtlCol="0">
+            <a:spAutoFit/>
           </a:bodyPr>
           <a:lstStyle/>
           <a:p>
-            <a:pPr algn="ctr"/>
-            <a:r>
-              <a:rPr lang="en-US" sz="2400" dirty="0" smtClean="0">
-                <a:solidFill>
-                  <a:schemeClr val="bg1"/>
-                </a:solidFill>
-              </a:rPr>
-              <a:t>PAUSED</a:t>
-            </a:r>
-          </a:p>
-        </p:txBody>
-      </p:sp>
-      <p:sp>
-        <p:nvSpPr>
-          <p:cNvPr id="54" name="TextBox 53"/>
-          <p:cNvSpPr txBox="1">
-            <a:spLocks/>
-          </p:cNvSpPr>
+            <a:r>
+              <a:rPr lang="en-US" sz="1200" dirty="0" err="1" smtClean="0"/>
+              <a:t>menuStart</a:t>
+            </a:r>
+            <a:endParaRPr lang="en-US" sz="1200" dirty="0"/>
+          </a:p>
+        </p:txBody>
+      </p:sp>
+      <p:sp>
+        <p:nvSpPr>
+          <p:cNvPr id="282" name="TextBox 281"/>
+          <p:cNvSpPr txBox="1"/>
           <p:nvPr/>
         </p:nvSpPr>
         <p:spPr>
-          <a:xfrm rot="19549393" flipH="1">
-            <a:off x="1415237" y="2268015"/>
-            <a:ext cx="3665732" cy="460787"/>
-          </a:xfrm>
-          <a:prstGeom prst="rightArrow">
-            <a:avLst>
-              <a:gd name="adj1" fmla="val 50000"/>
-              <a:gd name="adj2" fmla="val 37112"/>
-            </a:avLst>
-          </a:prstGeom>
-          <a:solidFill>
-            <a:schemeClr val="tx1"/>
-          </a:solidFill>
-        </p:spPr>
-        <p:txBody>
-          <a:bodyPr wrap="square" rtlCol="0" anchor="ctr" anchorCtr="1">
-            <a:noAutofit/>
+          <a:xfrm>
+            <a:off x="4964971" y="6235776"/>
+            <a:ext cx="851515" cy="276999"/>
+          </a:xfrm>
+          <a:prstGeom prst="rect">
+            <a:avLst/>
+          </a:prstGeom>
+          <a:noFill/>
+        </p:spPr>
+        <p:txBody>
+          <a:bodyPr wrap="none" rtlCol="0">
+            <a:spAutoFit/>
           </a:bodyPr>
           <a:lstStyle/>
           <a:p>
-            <a:pPr algn="ctr">
-              <a:lnSpc>
-                <a:spcPct val="60000"/>
-              </a:lnSpc>
-            </a:pPr>
-            <a:r>
-              <a:rPr lang="en-US" sz="1400" dirty="0" smtClean="0">
-                <a:solidFill>
-                  <a:schemeClr val="bg1"/>
-                </a:solidFill>
-              </a:rPr>
-              <a:t>PAUSE</a:t>
-            </a:r>
-            <a:endParaRPr lang="en-US" dirty="0" smtClean="0">
-              <a:solidFill>
-                <a:schemeClr val="bg1"/>
-              </a:solidFill>
-            </a:endParaRPr>
-          </a:p>
-        </p:txBody>
-      </p:sp>
-      <p:sp>
-        <p:nvSpPr>
-          <p:cNvPr id="23" name="TextBox 22"/>
-          <p:cNvSpPr txBox="1">
-            <a:spLocks/>
-          </p:cNvSpPr>
+            <a:r>
+              <a:rPr lang="en-US" sz="1200" dirty="0" err="1" smtClean="0"/>
+              <a:t>menuStart</a:t>
+            </a:r>
+            <a:endParaRPr lang="en-US" sz="1200" dirty="0"/>
+          </a:p>
+        </p:txBody>
+      </p:sp>
+      <p:sp>
+        <p:nvSpPr>
+          <p:cNvPr id="283" name="TextBox 282"/>
+          <p:cNvSpPr txBox="1"/>
           <p:nvPr/>
         </p:nvSpPr>
         <p:spPr>
           <a:xfrm>
-            <a:off x="3634046" y="1062180"/>
-            <a:ext cx="1891826" cy="1143000"/>
-          </a:xfrm>
-          <a:prstGeom prst="roundRect">
-            <a:avLst/>
-          </a:prstGeom>
-          <a:solidFill>
-            <a:schemeClr val="accent1"/>
-          </a:solidFill>
-        </p:spPr>
-        <p:txBody>
-          <a:bodyPr wrap="square" rtlCol="0" anchor="ctr" anchorCtr="1">
-            <a:noAutofit/>
+            <a:off x="5425130" y="4964799"/>
+            <a:ext cx="782711" cy="276999"/>
+          </a:xfrm>
+          <a:prstGeom prst="rect">
+            <a:avLst/>
+          </a:prstGeom>
+          <a:noFill/>
+        </p:spPr>
+        <p:txBody>
+          <a:bodyPr wrap="none" rtlCol="0">
+            <a:spAutoFit/>
           </a:bodyPr>
           <a:lstStyle/>
           <a:p>
-            <a:pPr algn="ctr"/>
-            <a:r>
-              <a:rPr lang="en-US" sz="2400" dirty="0" smtClean="0">
-                <a:solidFill>
-                  <a:schemeClr val="bg1"/>
-                </a:solidFill>
-              </a:rPr>
-              <a:t>IDLE</a:t>
-            </a:r>
-          </a:p>
-        </p:txBody>
-      </p:sp>
-      <p:sp>
-        <p:nvSpPr>
-          <p:cNvPr id="57" name="TextBox 56"/>
-          <p:cNvSpPr txBox="1">
-            <a:spLocks/>
-          </p:cNvSpPr>
+            <a:r>
+              <a:rPr lang="en-US" sz="1200" dirty="0" err="1" smtClean="0"/>
+              <a:t>menuEnd</a:t>
+            </a:r>
+            <a:endParaRPr lang="en-US" sz="1200" dirty="0"/>
+          </a:p>
+        </p:txBody>
+      </p:sp>
+      <p:sp>
+        <p:nvSpPr>
+          <p:cNvPr id="285" name="TextBox 284"/>
+          <p:cNvSpPr txBox="1"/>
           <p:nvPr/>
         </p:nvSpPr>
         <p:spPr>
-          <a:xfrm rot="5400000" flipH="1">
-            <a:off x="2411835" y="3247911"/>
-            <a:ext cx="3382555" cy="1297094"/>
-          </a:xfrm>
-          <a:prstGeom prst="rightArrow">
-            <a:avLst>
-              <a:gd name="adj1" fmla="val 50000"/>
-              <a:gd name="adj2" fmla="val 37112"/>
-            </a:avLst>
-          </a:prstGeom>
-          <a:solidFill>
-            <a:schemeClr val="tx1"/>
-          </a:solidFill>
-        </p:spPr>
-        <p:txBody>
-          <a:bodyPr vert="vert270" wrap="square" rtlCol="0" anchor="ctr" anchorCtr="1">
-            <a:noAutofit/>
+          <a:xfrm>
+            <a:off x="4487622" y="4367874"/>
+            <a:ext cx="880407" cy="246221"/>
+          </a:xfrm>
+          <a:prstGeom prst="rect">
+            <a:avLst/>
+          </a:prstGeom>
+          <a:noFill/>
+        </p:spPr>
+        <p:txBody>
+          <a:bodyPr wrap="none" rtlCol="0">
+            <a:spAutoFit/>
           </a:bodyPr>
           <a:lstStyle/>
           <a:p>
-            <a:pPr algn="ctr">
-              <a:lnSpc>
-                <a:spcPct val="60000"/>
-              </a:lnSpc>
-            </a:pPr>
-            <a:endParaRPr lang="en-US" sz="1400" dirty="0" smtClean="0">
-              <a:solidFill>
-                <a:schemeClr val="bg1"/>
-              </a:solidFill>
-            </a:endParaRPr>
-          </a:p>
-          <a:p>
-            <a:pPr algn="ctr">
-              <a:lnSpc>
-                <a:spcPct val="60000"/>
-              </a:lnSpc>
-            </a:pPr>
-            <a:endParaRPr lang="en-US" sz="1400" dirty="0">
-              <a:solidFill>
-                <a:schemeClr val="bg1"/>
-              </a:solidFill>
-            </a:endParaRPr>
-          </a:p>
-          <a:p>
-            <a:pPr algn="ctr">
-              <a:lnSpc>
-                <a:spcPct val="60000"/>
-              </a:lnSpc>
-            </a:pPr>
-            <a:endParaRPr lang="en-US" sz="1400" dirty="0" smtClean="0">
-              <a:solidFill>
-                <a:schemeClr val="bg1"/>
-              </a:solidFill>
-            </a:endParaRPr>
-          </a:p>
-          <a:p>
-            <a:pPr algn="ctr">
-              <a:lnSpc>
-                <a:spcPct val="60000"/>
-              </a:lnSpc>
-            </a:pPr>
-            <a:endParaRPr lang="en-US" sz="1400" dirty="0">
-              <a:solidFill>
-                <a:schemeClr val="bg1"/>
-              </a:solidFill>
-            </a:endParaRPr>
-          </a:p>
-          <a:p>
-            <a:pPr algn="ctr">
-              <a:lnSpc>
-                <a:spcPct val="60000"/>
-              </a:lnSpc>
-            </a:pPr>
-            <a:endParaRPr lang="en-US" sz="1400" dirty="0" smtClean="0">
-              <a:solidFill>
-                <a:schemeClr val="bg1"/>
-              </a:solidFill>
-            </a:endParaRPr>
-          </a:p>
-          <a:p>
-            <a:pPr algn="ctr">
-              <a:lnSpc>
-                <a:spcPct val="60000"/>
-              </a:lnSpc>
-            </a:pPr>
-            <a:endParaRPr lang="en-US" sz="1400" dirty="0">
-              <a:solidFill>
-                <a:schemeClr val="bg1"/>
-              </a:solidFill>
-            </a:endParaRPr>
-          </a:p>
-          <a:p>
-            <a:pPr algn="ctr">
-              <a:lnSpc>
-                <a:spcPct val="60000"/>
-              </a:lnSpc>
-            </a:pPr>
-            <a:endParaRPr lang="en-US" sz="1400" dirty="0" smtClean="0">
-              <a:solidFill>
-                <a:schemeClr val="bg1"/>
-              </a:solidFill>
-            </a:endParaRPr>
-          </a:p>
-          <a:p>
-            <a:pPr algn="ctr">
-              <a:lnSpc>
-                <a:spcPct val="60000"/>
-              </a:lnSpc>
-            </a:pPr>
-            <a:endParaRPr lang="en-US" sz="1400" dirty="0">
-              <a:solidFill>
-                <a:schemeClr val="bg1"/>
-              </a:solidFill>
-            </a:endParaRPr>
-          </a:p>
-          <a:p>
-            <a:pPr algn="ctr">
-              <a:lnSpc>
-                <a:spcPct val="60000"/>
-              </a:lnSpc>
-            </a:pPr>
-            <a:endParaRPr lang="en-US" sz="1400" dirty="0" smtClean="0">
-              <a:solidFill>
-                <a:schemeClr val="bg1"/>
-              </a:solidFill>
-            </a:endParaRPr>
-          </a:p>
-          <a:p>
-            <a:pPr algn="ctr">
-              <a:lnSpc>
-                <a:spcPct val="60000"/>
-              </a:lnSpc>
-            </a:pPr>
-            <a:endParaRPr lang="en-US" sz="1400" dirty="0">
-              <a:solidFill>
-                <a:schemeClr val="bg1"/>
-              </a:solidFill>
-            </a:endParaRPr>
-          </a:p>
-          <a:p>
-            <a:pPr algn="ctr">
-              <a:lnSpc>
-                <a:spcPct val="60000"/>
-              </a:lnSpc>
-            </a:pPr>
-            <a:endParaRPr lang="en-US" sz="1400" dirty="0" smtClean="0">
-              <a:solidFill>
-                <a:schemeClr val="bg1"/>
-              </a:solidFill>
-            </a:endParaRPr>
-          </a:p>
-          <a:p>
-            <a:pPr algn="ctr">
-              <a:lnSpc>
-                <a:spcPct val="60000"/>
-              </a:lnSpc>
-            </a:pPr>
-            <a:endParaRPr lang="en-US" sz="1400" dirty="0">
-              <a:solidFill>
-                <a:schemeClr val="bg1"/>
-              </a:solidFill>
-            </a:endParaRPr>
-          </a:p>
-          <a:p>
-            <a:pPr algn="ctr">
-              <a:lnSpc>
-                <a:spcPct val="60000"/>
-              </a:lnSpc>
-            </a:pPr>
-            <a:endParaRPr lang="en-US" sz="1400" dirty="0" smtClean="0">
-              <a:solidFill>
-                <a:schemeClr val="bg1"/>
-              </a:solidFill>
-            </a:endParaRPr>
-          </a:p>
-          <a:p>
-            <a:pPr algn="ctr">
-              <a:lnSpc>
-                <a:spcPct val="60000"/>
-              </a:lnSpc>
-            </a:pPr>
-            <a:endParaRPr lang="en-US" sz="1400" dirty="0">
-              <a:solidFill>
-                <a:schemeClr val="bg1"/>
-              </a:solidFill>
-            </a:endParaRPr>
-          </a:p>
-          <a:p>
-            <a:pPr algn="ctr">
-              <a:lnSpc>
-                <a:spcPct val="60000"/>
-              </a:lnSpc>
-            </a:pPr>
-            <a:endParaRPr lang="en-US" sz="1400" dirty="0" smtClean="0">
-              <a:solidFill>
-                <a:schemeClr val="bg1"/>
-              </a:solidFill>
-            </a:endParaRPr>
-          </a:p>
-          <a:p>
-            <a:pPr algn="ctr">
-              <a:lnSpc>
-                <a:spcPct val="60000"/>
-              </a:lnSpc>
-            </a:pPr>
-            <a:r>
-              <a:rPr lang="en-US" sz="1400" dirty="0" smtClean="0">
-                <a:solidFill>
-                  <a:schemeClr val="bg1"/>
-                </a:solidFill>
-              </a:rPr>
-              <a:t>WAIT FOR MOVE</a:t>
-            </a:r>
-            <a:endParaRPr lang="en-US" dirty="0" smtClean="0">
-              <a:solidFill>
-                <a:schemeClr val="bg1"/>
-              </a:solidFill>
-            </a:endParaRPr>
-          </a:p>
-        </p:txBody>
-      </p:sp>
-      <p:sp>
-        <p:nvSpPr>
-          <p:cNvPr id="22" name="TextBox 21"/>
-          <p:cNvSpPr txBox="1">
-            <a:spLocks/>
-          </p:cNvSpPr>
+            <a:r>
+              <a:rPr lang="en-US" sz="1000" dirty="0" err="1" smtClean="0"/>
+              <a:t>waitForMove</a:t>
+            </a:r>
+            <a:endParaRPr lang="en-US" sz="1200" dirty="0"/>
+          </a:p>
+        </p:txBody>
+      </p:sp>
+      <p:sp>
+        <p:nvSpPr>
+          <p:cNvPr id="286" name="TextBox 285"/>
+          <p:cNvSpPr txBox="1"/>
           <p:nvPr/>
         </p:nvSpPr>
         <p:spPr>
           <a:xfrm>
-            <a:off x="4103113" y="3478345"/>
-            <a:ext cx="1891826" cy="1143000"/>
-          </a:xfrm>
-          <a:prstGeom prst="roundRect">
-            <a:avLst/>
-          </a:prstGeom>
-          <a:solidFill>
-            <a:schemeClr val="accent1"/>
-          </a:solidFill>
-        </p:spPr>
-        <p:txBody>
-          <a:bodyPr wrap="square" rtlCol="0" anchor="ctr" anchorCtr="1">
-            <a:noAutofit/>
+            <a:off x="5019918" y="4081214"/>
+            <a:ext cx="880407" cy="246221"/>
+          </a:xfrm>
+          <a:prstGeom prst="rect">
+            <a:avLst/>
+          </a:prstGeom>
+          <a:noFill/>
+        </p:spPr>
+        <p:txBody>
+          <a:bodyPr wrap="none" rtlCol="0">
+            <a:spAutoFit/>
           </a:bodyPr>
           <a:lstStyle/>
           <a:p>
-            <a:pPr algn="ctr"/>
-            <a:r>
-              <a:rPr lang="en-US" sz="2400" dirty="0" smtClean="0">
-                <a:solidFill>
-                  <a:schemeClr val="bg1"/>
-                </a:solidFill>
-              </a:rPr>
-              <a:t>PAYING FOR CONTINUE</a:t>
-            </a:r>
+            <a:r>
+              <a:rPr lang="en-US" sz="1000" dirty="0" err="1" smtClean="0"/>
+              <a:t>waitForMove</a:t>
+            </a:r>
+            <a:endParaRPr lang="en-US" sz="1200" dirty="0"/>
+          </a:p>
+        </p:txBody>
+      </p:sp>
+      <p:sp>
+        <p:nvSpPr>
+          <p:cNvPr id="287" name="TextBox 286"/>
+          <p:cNvSpPr txBox="1"/>
+          <p:nvPr/>
+        </p:nvSpPr>
+        <p:spPr>
+          <a:xfrm>
+            <a:off x="5162695" y="3453085"/>
+            <a:ext cx="880407" cy="246221"/>
+          </a:xfrm>
+          <a:prstGeom prst="rect">
+            <a:avLst/>
+          </a:prstGeom>
+          <a:noFill/>
+        </p:spPr>
+        <p:txBody>
+          <a:bodyPr wrap="none" rtlCol="0">
+            <a:spAutoFit/>
+          </a:bodyPr>
+          <a:lstStyle/>
+          <a:p>
+            <a:r>
+              <a:rPr lang="en-US" sz="1000" dirty="0" err="1" smtClean="0"/>
+              <a:t>waitForMove</a:t>
+            </a:r>
+            <a:endParaRPr lang="en-US" sz="1200" dirty="0"/>
+          </a:p>
+        </p:txBody>
+      </p:sp>
+      <p:sp>
+        <p:nvSpPr>
+          <p:cNvPr id="288" name="TextBox 287"/>
+          <p:cNvSpPr txBox="1"/>
+          <p:nvPr/>
+        </p:nvSpPr>
+        <p:spPr>
+          <a:xfrm>
+            <a:off x="3607215" y="2789797"/>
+            <a:ext cx="880407" cy="246221"/>
+          </a:xfrm>
+          <a:prstGeom prst="rect">
+            <a:avLst/>
+          </a:prstGeom>
+          <a:noFill/>
+        </p:spPr>
+        <p:txBody>
+          <a:bodyPr wrap="none" rtlCol="0">
+            <a:spAutoFit/>
+          </a:bodyPr>
+          <a:lstStyle/>
+          <a:p>
+            <a:r>
+              <a:rPr lang="en-US" sz="1000" dirty="0" err="1" smtClean="0"/>
+              <a:t>waitForMove</a:t>
+            </a:r>
+            <a:endParaRPr lang="en-US" sz="1200" dirty="0"/>
+          </a:p>
+        </p:txBody>
+      </p:sp>
+      <p:sp>
+        <p:nvSpPr>
+          <p:cNvPr id="289" name="TextBox 288"/>
+          <p:cNvSpPr txBox="1"/>
+          <p:nvPr/>
+        </p:nvSpPr>
+        <p:spPr>
+          <a:xfrm>
+            <a:off x="2886379" y="3683079"/>
+            <a:ext cx="880407" cy="246221"/>
+          </a:xfrm>
+          <a:prstGeom prst="rect">
+            <a:avLst/>
+          </a:prstGeom>
+          <a:noFill/>
+        </p:spPr>
+        <p:txBody>
+          <a:bodyPr wrap="none" rtlCol="0">
+            <a:spAutoFit/>
+          </a:bodyPr>
+          <a:lstStyle/>
+          <a:p>
+            <a:r>
+              <a:rPr lang="en-US" sz="1000" dirty="0" err="1" smtClean="0"/>
+              <a:t>waitForMove</a:t>
+            </a:r>
+            <a:endParaRPr lang="en-US" sz="1200" dirty="0"/>
+          </a:p>
+        </p:txBody>
+      </p:sp>
+      <p:sp>
+        <p:nvSpPr>
+          <p:cNvPr id="290" name="TextBox 289"/>
+          <p:cNvSpPr txBox="1"/>
+          <p:nvPr/>
+        </p:nvSpPr>
+        <p:spPr>
+          <a:xfrm>
+            <a:off x="3476191" y="4402049"/>
+            <a:ext cx="880407" cy="246221"/>
+          </a:xfrm>
+          <a:prstGeom prst="rect">
+            <a:avLst/>
+          </a:prstGeom>
+          <a:noFill/>
+        </p:spPr>
+        <p:txBody>
+          <a:bodyPr wrap="none" rtlCol="0">
+            <a:spAutoFit/>
+          </a:bodyPr>
+          <a:lstStyle/>
+          <a:p>
+            <a:r>
+              <a:rPr lang="en-US" sz="1000" dirty="0" err="1" smtClean="0"/>
+              <a:t>waitForMove</a:t>
+            </a:r>
+            <a:endParaRPr lang="en-US" sz="1200" dirty="0"/>
+          </a:p>
+        </p:txBody>
+      </p:sp>
+      <p:sp>
+        <p:nvSpPr>
+          <p:cNvPr id="291" name="TextBox 290"/>
+          <p:cNvSpPr txBox="1"/>
+          <p:nvPr/>
+        </p:nvSpPr>
+        <p:spPr>
+          <a:xfrm>
+            <a:off x="8361289" y="5694290"/>
+            <a:ext cx="782711" cy="276999"/>
+          </a:xfrm>
+          <a:prstGeom prst="rect">
+            <a:avLst/>
+          </a:prstGeom>
+          <a:noFill/>
+        </p:spPr>
+        <p:txBody>
+          <a:bodyPr wrap="none" rtlCol="0">
+            <a:spAutoFit/>
+          </a:bodyPr>
+          <a:lstStyle/>
+          <a:p>
+            <a:r>
+              <a:rPr lang="en-US" sz="1200" dirty="0" err="1" smtClean="0"/>
+              <a:t>menuEnd</a:t>
+            </a:r>
+            <a:endParaRPr lang="en-US" sz="1200" dirty="0"/>
           </a:p>
         </p:txBody>
       </p:sp>
@@ -4321,7 +5040,7 @@
           <a:p>
             <a:r>
               <a:rPr lang="en-US" dirty="0" smtClean="0"/>
-              <a:t>Idle State Details</a:t>
+              <a:t>Finite State Machine (FSM) Rules</a:t>
             </a:r>
             <a:endParaRPr lang="en-US" dirty="0"/>
           </a:p>
@@ -4339,77 +5058,29 @@
         </p:nvSpPr>
         <p:spPr/>
         <p:txBody>
-          <a:bodyPr>
-            <a:normAutofit fontScale="92500" lnSpcReduction="20000"/>
-          </a:bodyPr>
+          <a:bodyPr/>
           <a:lstStyle/>
           <a:p>
             <a:r>
               <a:rPr lang="en-US" dirty="0" smtClean="0"/>
-              <a:t>Can enter from states</a:t>
-            </a:r>
-          </a:p>
-          <a:p>
-            <a:pPr lvl="1"/>
+              <a:t>The FSM always preempts the present scene call, meaning that </a:t>
+            </a:r>
+            <a:r>
+              <a:rPr lang="en-US" dirty="0" err="1" smtClean="0"/>
+              <a:t>presentScene</a:t>
+            </a:r>
             <a:r>
               <a:rPr lang="en-US" dirty="0" smtClean="0"/>
-              <a:t>End</a:t>
-            </a:r>
-          </a:p>
-          <a:p>
-            <a:pPr lvl="1"/>
-            <a:r>
-              <a:rPr lang="en-US" dirty="0" smtClean="0"/>
-              <a:t>Falling Monkey</a:t>
-            </a:r>
-          </a:p>
-          <a:p>
-            <a:pPr lvl="1"/>
-            <a:r>
-              <a:rPr lang="en-US" dirty="0" smtClean="0"/>
-              <a:t>Processing Move</a:t>
-            </a:r>
-          </a:p>
-          <a:p>
-            <a:pPr lvl="1"/>
-            <a:r>
-              <a:rPr lang="en-US" dirty="0" smtClean="0"/>
-              <a:t>Paying for Continue</a:t>
-            </a:r>
-          </a:p>
-          <a:p>
-            <a:pPr lvl="1"/>
-            <a:r>
-              <a:rPr lang="en-US" dirty="0" smtClean="0"/>
-              <a:t>Paused</a:t>
-            </a:r>
-          </a:p>
-          <a:p>
-            <a:r>
-              <a:rPr lang="en-US" dirty="0" smtClean="0"/>
-              <a:t>Assumptions</a:t>
-            </a:r>
-          </a:p>
-          <a:p>
-            <a:pPr lvl="1"/>
-            <a:r>
-              <a:rPr lang="en-US" dirty="0" smtClean="0"/>
-              <a:t>Move data is correct</a:t>
-            </a:r>
-          </a:p>
-          <a:p>
-            <a:pPr lvl="1"/>
-            <a:r>
-              <a:rPr lang="en-US" dirty="0" smtClean="0"/>
-              <a:t>Present scene will correctly transition to the game scene no matter what scene we are currently in when entering this state.</a:t>
-            </a:r>
+              <a:t> method calls shall only be called from the FSM enters or exits.</a:t>
+            </a:r>
+            <a:endParaRPr lang="en-US" dirty="0"/>
           </a:p>
         </p:txBody>
       </p:sp>
     </p:spTree>
     <p:extLst>
       <p:ext uri="{BB962C8B-B14F-4D97-AF65-F5344CB8AC3E}">
-        <p14:creationId xmlns:p14="http://schemas.microsoft.com/office/powerpoint/2010/main" val="996580574"/>
+        <p14:creationId xmlns:p14="http://schemas.microsoft.com/office/powerpoint/2010/main" val="4247147180"/>
       </p:ext>
     </p:extLst>
   </p:cSld>
@@ -4446,843 +5117,102 @@
             <p:ph type="title"/>
           </p:nvPr>
         </p:nvSpPr>
-        <p:spPr>
-          <a:xfrm>
-            <a:off x="457200" y="0"/>
-            <a:ext cx="8229600" cy="629274"/>
-          </a:xfrm>
-        </p:spPr>
+        <p:spPr/>
+        <p:txBody>
+          <a:bodyPr/>
+          <a:lstStyle/>
+          <a:p>
+            <a:r>
+              <a:rPr lang="en-US" dirty="0" smtClean="0"/>
+              <a:t>Idle State Details</a:t>
+            </a:r>
+            <a:endParaRPr lang="en-US" dirty="0"/>
+          </a:p>
+        </p:txBody>
+      </p:sp>
+      <p:sp>
+        <p:nvSpPr>
+          <p:cNvPr id="3" name="Content Placeholder 2"/>
+          <p:cNvSpPr>
+            <a:spLocks noGrp="1"/>
+          </p:cNvSpPr>
+          <p:nvPr>
+            <p:ph idx="1"/>
+          </p:nvPr>
+        </p:nvSpPr>
+        <p:spPr/>
         <p:txBody>
           <a:bodyPr>
-            <a:normAutofit fontScale="90000"/>
+            <a:normAutofit fontScale="92500" lnSpcReduction="20000"/>
           </a:bodyPr>
           <a:lstStyle/>
           <a:p>
             <a:r>
               <a:rPr lang="en-US" dirty="0" smtClean="0"/>
-              <a:t>Idle State Flow</a:t>
-            </a:r>
-            <a:endParaRPr lang="en-US" dirty="0"/>
-          </a:p>
-        </p:txBody>
-      </p:sp>
-      <p:sp>
-        <p:nvSpPr>
-          <p:cNvPr id="10" name="Preparation 9"/>
-          <p:cNvSpPr/>
-          <p:nvPr/>
-        </p:nvSpPr>
-        <p:spPr>
-          <a:xfrm>
-            <a:off x="760808" y="296080"/>
-            <a:ext cx="1224158" cy="666387"/>
-          </a:xfrm>
-          <a:prstGeom prst="flowChartPreparation">
-            <a:avLst/>
-          </a:prstGeom>
-        </p:spPr>
-        <p:style>
-          <a:lnRef idx="1">
-            <a:schemeClr val="accent1"/>
-          </a:lnRef>
-          <a:fillRef idx="3">
-            <a:schemeClr val="accent1"/>
-          </a:fillRef>
-          <a:effectRef idx="2">
-            <a:schemeClr val="accent1"/>
-          </a:effectRef>
-          <a:fontRef idx="minor">
-            <a:schemeClr val="lt1"/>
-          </a:fontRef>
-        </p:style>
-        <p:txBody>
-          <a:bodyPr rtlCol="0" anchor="ctr"/>
-          <a:lstStyle/>
-          <a:p>
-            <a:pPr algn="ctr"/>
-            <a:r>
-              <a:rPr lang="en-US" sz="1600" dirty="0" smtClean="0"/>
-              <a:t>START</a:t>
-            </a:r>
-            <a:endParaRPr lang="en-US" sz="1600" dirty="0"/>
-          </a:p>
-        </p:txBody>
-      </p:sp>
-      <p:sp>
-        <p:nvSpPr>
-          <p:cNvPr id="12" name="Process 11"/>
-          <p:cNvSpPr/>
-          <p:nvPr/>
-        </p:nvSpPr>
-        <p:spPr>
-          <a:xfrm>
-            <a:off x="3031792" y="1864964"/>
-            <a:ext cx="1327124" cy="652189"/>
-          </a:xfrm>
-          <a:prstGeom prst="flowChartProcess">
-            <a:avLst/>
-          </a:prstGeom>
-        </p:spPr>
-        <p:style>
-          <a:lnRef idx="1">
-            <a:schemeClr val="accent1"/>
-          </a:lnRef>
-          <a:fillRef idx="3">
-            <a:schemeClr val="accent1"/>
-          </a:fillRef>
-          <a:effectRef idx="2">
-            <a:schemeClr val="accent1"/>
-          </a:effectRef>
-          <a:fontRef idx="minor">
-            <a:schemeClr val="lt1"/>
-          </a:fontRef>
-        </p:style>
-        <p:txBody>
-          <a:bodyPr rtlCol="0" anchor="ctr"/>
-          <a:lstStyle/>
-          <a:p>
-            <a:pPr algn="ctr"/>
+              <a:t>Can enter from states</a:t>
+            </a:r>
+          </a:p>
+          <a:p>
+            <a:pPr lvl="1"/>
             <a:r>
               <a:rPr lang="en-US" dirty="0" smtClean="0"/>
-              <a:t>Load Game Scene</a:t>
-            </a:r>
-            <a:endParaRPr lang="en-US" dirty="0"/>
-          </a:p>
-        </p:txBody>
-      </p:sp>
-      <p:sp>
-        <p:nvSpPr>
-          <p:cNvPr id="13" name="Decision 12"/>
-          <p:cNvSpPr/>
-          <p:nvPr/>
-        </p:nvSpPr>
-        <p:spPr>
-          <a:xfrm>
-            <a:off x="440089" y="1458776"/>
-            <a:ext cx="1865267" cy="1464565"/>
-          </a:xfrm>
-          <a:prstGeom prst="flowChartDecision">
-            <a:avLst/>
-          </a:prstGeom>
-        </p:spPr>
-        <p:style>
-          <a:lnRef idx="1">
-            <a:schemeClr val="accent1"/>
-          </a:lnRef>
-          <a:fillRef idx="3">
-            <a:schemeClr val="accent1"/>
-          </a:fillRef>
-          <a:effectRef idx="2">
-            <a:schemeClr val="accent1"/>
-          </a:effectRef>
-          <a:fontRef idx="minor">
-            <a:schemeClr val="lt1"/>
-          </a:fontRef>
-        </p:style>
-        <p:txBody>
-          <a:bodyPr rtlCol="0" anchor="ctr"/>
-          <a:lstStyle/>
-          <a:p>
-            <a:pPr algn="ctr"/>
+              <a:t>End</a:t>
+            </a:r>
+          </a:p>
+          <a:p>
+            <a:pPr lvl="1"/>
             <a:r>
               <a:rPr lang="en-US" dirty="0" smtClean="0"/>
-              <a:t>Game Scene loaded?</a:t>
-            </a:r>
-            <a:endParaRPr lang="en-US" dirty="0"/>
-          </a:p>
-        </p:txBody>
-      </p:sp>
-      <p:cxnSp>
-        <p:nvCxnSpPr>
-          <p:cNvPr id="15" name="Straight Arrow Connector 14"/>
-          <p:cNvCxnSpPr>
-            <a:stCxn id="13" idx="3"/>
-            <a:endCxn id="12" idx="1"/>
-          </p:cNvCxnSpPr>
-          <p:nvPr/>
-        </p:nvCxnSpPr>
-        <p:spPr>
-          <a:xfrm>
-            <a:off x="2305356" y="2191059"/>
-            <a:ext cx="726436" cy="0"/>
-          </a:xfrm>
-          <a:prstGeom prst="straightConnector1">
-            <a:avLst/>
-          </a:prstGeom>
-          <a:ln>
-            <a:tailEnd type="arrow"/>
-          </a:ln>
-        </p:spPr>
-        <p:style>
-          <a:lnRef idx="2">
-            <a:schemeClr val="accent1"/>
-          </a:lnRef>
-          <a:fillRef idx="0">
-            <a:schemeClr val="accent1"/>
-          </a:fillRef>
-          <a:effectRef idx="1">
-            <a:schemeClr val="accent1"/>
-          </a:effectRef>
-          <a:fontRef idx="minor">
-            <a:schemeClr val="tx1"/>
-          </a:fontRef>
-        </p:style>
-      </p:cxnSp>
-      <p:sp>
-        <p:nvSpPr>
-          <p:cNvPr id="16" name="TextBox 15"/>
-          <p:cNvSpPr txBox="1"/>
-          <p:nvPr/>
-        </p:nvSpPr>
-        <p:spPr>
-          <a:xfrm>
-            <a:off x="2385443" y="2099366"/>
-            <a:ext cx="486506" cy="369332"/>
-          </a:xfrm>
-          <a:prstGeom prst="rect">
-            <a:avLst/>
-          </a:prstGeom>
-          <a:noFill/>
-        </p:spPr>
-        <p:txBody>
-          <a:bodyPr wrap="none" rtlCol="0">
-            <a:spAutoFit/>
-          </a:bodyPr>
-          <a:lstStyle/>
-          <a:p>
+              <a:t>Falling Monkey</a:t>
+            </a:r>
+          </a:p>
+          <a:p>
+            <a:pPr lvl="1"/>
             <a:r>
               <a:rPr lang="en-US" dirty="0" smtClean="0"/>
-              <a:t>NO</a:t>
-            </a:r>
-            <a:endParaRPr lang="en-US" dirty="0"/>
-          </a:p>
-        </p:txBody>
-      </p:sp>
-      <p:cxnSp>
-        <p:nvCxnSpPr>
-          <p:cNvPr id="23" name="Straight Arrow Connector 22" title="YES"/>
-          <p:cNvCxnSpPr>
-            <a:stCxn id="10" idx="2"/>
-            <a:endCxn id="13" idx="0"/>
-          </p:cNvCxnSpPr>
-          <p:nvPr/>
-        </p:nvCxnSpPr>
-        <p:spPr>
-          <a:xfrm flipH="1">
-            <a:off x="1372723" y="962467"/>
-            <a:ext cx="164" cy="496309"/>
-          </a:xfrm>
-          <a:prstGeom prst="straightConnector1">
-            <a:avLst/>
-          </a:prstGeom>
-          <a:ln>
-            <a:tailEnd type="arrow"/>
-          </a:ln>
-        </p:spPr>
-        <p:style>
-          <a:lnRef idx="2">
-            <a:schemeClr val="accent1"/>
-          </a:lnRef>
-          <a:fillRef idx="0">
-            <a:schemeClr val="accent1"/>
-          </a:fillRef>
-          <a:effectRef idx="1">
-            <a:schemeClr val="accent1"/>
-          </a:effectRef>
-          <a:fontRef idx="minor">
-            <a:schemeClr val="tx1"/>
-          </a:fontRef>
-        </p:style>
-      </p:cxnSp>
-      <p:sp>
-        <p:nvSpPr>
-          <p:cNvPr id="36" name="TextBox 35"/>
-          <p:cNvSpPr txBox="1"/>
-          <p:nvPr/>
-        </p:nvSpPr>
-        <p:spPr>
-          <a:xfrm>
-            <a:off x="1461363" y="2947663"/>
-            <a:ext cx="518091" cy="369332"/>
-          </a:xfrm>
-          <a:prstGeom prst="rect">
-            <a:avLst/>
-          </a:prstGeom>
-          <a:noFill/>
-        </p:spPr>
-        <p:txBody>
-          <a:bodyPr wrap="none" rtlCol="0">
-            <a:spAutoFit/>
-          </a:bodyPr>
-          <a:lstStyle/>
-          <a:p>
+              <a:t>Processing Move</a:t>
+            </a:r>
+          </a:p>
+          <a:p>
+            <a:pPr lvl="1"/>
             <a:r>
               <a:rPr lang="en-US" dirty="0" smtClean="0"/>
-              <a:t>YES</a:t>
-            </a:r>
-            <a:endParaRPr lang="en-US" dirty="0"/>
-          </a:p>
-        </p:txBody>
-      </p:sp>
-      <p:sp>
-        <p:nvSpPr>
-          <p:cNvPr id="46" name="Process 45"/>
-          <p:cNvSpPr/>
-          <p:nvPr/>
-        </p:nvSpPr>
-        <p:spPr>
-          <a:xfrm>
-            <a:off x="3031792" y="4022202"/>
-            <a:ext cx="1327124" cy="652189"/>
-          </a:xfrm>
-          <a:prstGeom prst="flowChartProcess">
-            <a:avLst/>
-          </a:prstGeom>
-        </p:spPr>
-        <p:style>
-          <a:lnRef idx="1">
-            <a:schemeClr val="accent1"/>
-          </a:lnRef>
-          <a:fillRef idx="3">
-            <a:schemeClr val="accent1"/>
-          </a:fillRef>
-          <a:effectRef idx="2">
-            <a:schemeClr val="accent1"/>
-          </a:effectRef>
-          <a:fontRef idx="minor">
-            <a:schemeClr val="lt1"/>
-          </a:fontRef>
-        </p:style>
-        <p:txBody>
-          <a:bodyPr rtlCol="0" anchor="ctr"/>
-          <a:lstStyle/>
-          <a:p>
-            <a:pPr algn="ctr"/>
-            <a:r>
-              <a:rPr lang="en-US" sz="1600" dirty="0" smtClean="0"/>
-              <a:t>Present Game Scene</a:t>
-            </a:r>
-            <a:endParaRPr lang="en-US" sz="1600" dirty="0"/>
-          </a:p>
-        </p:txBody>
-      </p:sp>
-      <p:sp>
-        <p:nvSpPr>
-          <p:cNvPr id="47" name="Decision 46"/>
-          <p:cNvSpPr/>
-          <p:nvPr/>
-        </p:nvSpPr>
-        <p:spPr>
-          <a:xfrm>
-            <a:off x="432909" y="3616015"/>
-            <a:ext cx="1865267" cy="1464565"/>
-          </a:xfrm>
-          <a:prstGeom prst="flowChartDecision">
-            <a:avLst/>
-          </a:prstGeom>
-        </p:spPr>
-        <p:style>
-          <a:lnRef idx="1">
-            <a:schemeClr val="accent1"/>
-          </a:lnRef>
-          <a:fillRef idx="3">
-            <a:schemeClr val="accent1"/>
-          </a:fillRef>
-          <a:effectRef idx="2">
-            <a:schemeClr val="accent1"/>
-          </a:effectRef>
-          <a:fontRef idx="minor">
-            <a:schemeClr val="lt1"/>
-          </a:fontRef>
-        </p:style>
-        <p:txBody>
-          <a:bodyPr rtlCol="0" anchor="ctr"/>
-          <a:lstStyle/>
-          <a:p>
-            <a:pPr algn="ctr"/>
-            <a:r>
-              <a:rPr lang="en-US" sz="1400" dirty="0" smtClean="0"/>
-              <a:t>Is current scene == game scene?</a:t>
-            </a:r>
-            <a:endParaRPr lang="en-US" sz="1400" dirty="0"/>
-          </a:p>
-        </p:txBody>
-      </p:sp>
-      <p:cxnSp>
-        <p:nvCxnSpPr>
-          <p:cNvPr id="48" name="Straight Arrow Connector 47"/>
-          <p:cNvCxnSpPr>
-            <a:stCxn id="47" idx="3"/>
-            <a:endCxn id="46" idx="1"/>
-          </p:cNvCxnSpPr>
-          <p:nvPr/>
-        </p:nvCxnSpPr>
-        <p:spPr>
-          <a:xfrm flipV="1">
-            <a:off x="2298176" y="4348297"/>
-            <a:ext cx="733616" cy="1"/>
-          </a:xfrm>
-          <a:prstGeom prst="straightConnector1">
-            <a:avLst/>
-          </a:prstGeom>
-          <a:ln>
-            <a:tailEnd type="arrow"/>
-          </a:ln>
-        </p:spPr>
-        <p:style>
-          <a:lnRef idx="2">
-            <a:schemeClr val="accent1"/>
-          </a:lnRef>
-          <a:fillRef idx="0">
-            <a:schemeClr val="accent1"/>
-          </a:fillRef>
-          <a:effectRef idx="1">
-            <a:schemeClr val="accent1"/>
-          </a:effectRef>
-          <a:fontRef idx="minor">
-            <a:schemeClr val="tx1"/>
-          </a:fontRef>
-        </p:style>
-      </p:cxnSp>
-      <p:sp>
-        <p:nvSpPr>
-          <p:cNvPr id="49" name="TextBox 48"/>
-          <p:cNvSpPr txBox="1"/>
-          <p:nvPr/>
-        </p:nvSpPr>
-        <p:spPr>
-          <a:xfrm>
-            <a:off x="2385443" y="3978966"/>
-            <a:ext cx="486506" cy="369332"/>
-          </a:xfrm>
-          <a:prstGeom prst="rect">
-            <a:avLst/>
-          </a:prstGeom>
-          <a:noFill/>
-        </p:spPr>
-        <p:txBody>
-          <a:bodyPr wrap="none" rtlCol="0">
-            <a:spAutoFit/>
-          </a:bodyPr>
-          <a:lstStyle/>
-          <a:p>
+              <a:t>Paying for Continue</a:t>
+            </a:r>
+          </a:p>
+          <a:p>
+            <a:pPr lvl="1"/>
             <a:r>
               <a:rPr lang="en-US" dirty="0" smtClean="0"/>
-              <a:t>NO</a:t>
-            </a:r>
-            <a:endParaRPr lang="en-US" dirty="0"/>
-          </a:p>
-        </p:txBody>
-      </p:sp>
-      <p:sp>
-        <p:nvSpPr>
-          <p:cNvPr id="51" name="TextBox 50"/>
-          <p:cNvSpPr txBox="1"/>
-          <p:nvPr/>
-        </p:nvSpPr>
-        <p:spPr>
-          <a:xfrm>
-            <a:off x="1372722" y="5703083"/>
-            <a:ext cx="518091" cy="369332"/>
-          </a:xfrm>
-          <a:prstGeom prst="rect">
-            <a:avLst/>
-          </a:prstGeom>
-          <a:noFill/>
-        </p:spPr>
-        <p:txBody>
-          <a:bodyPr wrap="none" rtlCol="0">
-            <a:spAutoFit/>
-          </a:bodyPr>
-          <a:lstStyle/>
+              <a:t>Paused</a:t>
+            </a:r>
+          </a:p>
           <a:p>
             <a:r>
               <a:rPr lang="en-US" dirty="0" smtClean="0"/>
-              <a:t>YES</a:t>
-            </a:r>
-            <a:endParaRPr lang="en-US" dirty="0"/>
-          </a:p>
-        </p:txBody>
-      </p:sp>
-      <p:sp>
-        <p:nvSpPr>
-          <p:cNvPr id="53" name="Display 52"/>
-          <p:cNvSpPr/>
-          <p:nvPr/>
-        </p:nvSpPr>
-        <p:spPr>
-          <a:xfrm>
-            <a:off x="2871949" y="5527040"/>
-            <a:ext cx="1627984" cy="1090750"/>
-          </a:xfrm>
-          <a:prstGeom prst="flowChartDisplay">
-            <a:avLst/>
-          </a:prstGeom>
-        </p:spPr>
-        <p:style>
-          <a:lnRef idx="1">
-            <a:schemeClr val="accent1"/>
-          </a:lnRef>
-          <a:fillRef idx="3">
-            <a:schemeClr val="accent1"/>
-          </a:fillRef>
-          <a:effectRef idx="2">
-            <a:schemeClr val="accent1"/>
-          </a:effectRef>
-          <a:fontRef idx="minor">
-            <a:schemeClr val="lt1"/>
-          </a:fontRef>
-        </p:style>
-        <p:txBody>
-          <a:bodyPr rtlCol="0" anchor="ctr"/>
-          <a:lstStyle/>
-          <a:p>
-            <a:pPr algn="ctr"/>
-            <a:r>
-              <a:rPr lang="en-US" sz="1600" dirty="0" smtClean="0"/>
-              <a:t>Redisplay screen</a:t>
-            </a:r>
-          </a:p>
-          <a:p>
-            <a:pPr algn="ctr"/>
-            <a:r>
-              <a:rPr lang="en-US" sz="1600" dirty="0" smtClean="0"/>
-              <a:t>w/ current move</a:t>
-            </a:r>
-            <a:endParaRPr lang="en-US" sz="1600" dirty="0"/>
-          </a:p>
-        </p:txBody>
-      </p:sp>
-      <p:cxnSp>
-        <p:nvCxnSpPr>
-          <p:cNvPr id="59" name="Elbow Connector 58"/>
-          <p:cNvCxnSpPr>
-            <a:stCxn id="47" idx="2"/>
-            <a:endCxn id="53" idx="1"/>
-          </p:cNvCxnSpPr>
-          <p:nvPr/>
-        </p:nvCxnSpPr>
-        <p:spPr>
-          <a:xfrm rot="16200000" flipH="1">
-            <a:off x="1622829" y="4823294"/>
-            <a:ext cx="991835" cy="1506406"/>
-          </a:xfrm>
-          <a:prstGeom prst="bentConnector2">
-            <a:avLst/>
-          </a:prstGeom>
-          <a:ln>
-            <a:tailEnd type="arrow"/>
-          </a:ln>
-        </p:spPr>
-        <p:style>
-          <a:lnRef idx="2">
-            <a:schemeClr val="accent1"/>
-          </a:lnRef>
-          <a:fillRef idx="0">
-            <a:schemeClr val="accent1"/>
-          </a:fillRef>
-          <a:effectRef idx="1">
-            <a:schemeClr val="accent1"/>
-          </a:effectRef>
-          <a:fontRef idx="minor">
-            <a:schemeClr val="tx1"/>
-          </a:fontRef>
-        </p:style>
-      </p:cxnSp>
-      <p:cxnSp>
-        <p:nvCxnSpPr>
-          <p:cNvPr id="61" name="Straight Arrow Connector 60"/>
-          <p:cNvCxnSpPr>
-            <a:stCxn id="46" idx="2"/>
-            <a:endCxn id="53" idx="0"/>
-          </p:cNvCxnSpPr>
-          <p:nvPr/>
-        </p:nvCxnSpPr>
-        <p:spPr>
-          <a:xfrm flipH="1">
-            <a:off x="3685941" y="4674391"/>
-            <a:ext cx="9413" cy="852649"/>
-          </a:xfrm>
-          <a:prstGeom prst="straightConnector1">
-            <a:avLst/>
-          </a:prstGeom>
-          <a:ln>
-            <a:tailEnd type="arrow"/>
-          </a:ln>
-        </p:spPr>
-        <p:style>
-          <a:lnRef idx="2">
-            <a:schemeClr val="accent1"/>
-          </a:lnRef>
-          <a:fillRef idx="0">
-            <a:schemeClr val="accent1"/>
-          </a:fillRef>
-          <a:effectRef idx="1">
-            <a:schemeClr val="accent1"/>
-          </a:effectRef>
-          <a:fontRef idx="minor">
-            <a:schemeClr val="tx1"/>
-          </a:fontRef>
-        </p:style>
-      </p:cxnSp>
-      <p:sp>
-        <p:nvSpPr>
-          <p:cNvPr id="62" name="Terminator 61"/>
-          <p:cNvSpPr/>
-          <p:nvPr/>
-        </p:nvSpPr>
-        <p:spPr>
-          <a:xfrm>
-            <a:off x="5852118" y="5723710"/>
-            <a:ext cx="2113364" cy="697410"/>
-          </a:xfrm>
-          <a:prstGeom prst="flowChartTerminator">
-            <a:avLst/>
-          </a:prstGeom>
-        </p:spPr>
-        <p:style>
-          <a:lnRef idx="1">
-            <a:schemeClr val="accent1"/>
-          </a:lnRef>
-          <a:fillRef idx="3">
-            <a:schemeClr val="accent1"/>
-          </a:fillRef>
-          <a:effectRef idx="2">
-            <a:schemeClr val="accent1"/>
-          </a:effectRef>
-          <a:fontRef idx="minor">
-            <a:schemeClr val="lt1"/>
-          </a:fontRef>
-        </p:style>
-        <p:txBody>
-          <a:bodyPr rtlCol="0" anchor="ctr"/>
-          <a:lstStyle/>
-          <a:p>
-            <a:pPr algn="ctr"/>
+              <a:t>Assumptions</a:t>
+            </a:r>
+          </a:p>
+          <a:p>
+            <a:pPr lvl="1"/>
             <a:r>
               <a:rPr lang="en-US" dirty="0" smtClean="0"/>
-              <a:t>END</a:t>
-            </a:r>
-            <a:endParaRPr lang="en-US" dirty="0"/>
-          </a:p>
-        </p:txBody>
-      </p:sp>
-      <p:cxnSp>
-        <p:nvCxnSpPr>
-          <p:cNvPr id="65" name="Straight Arrow Connector 64"/>
-          <p:cNvCxnSpPr>
-            <a:stCxn id="53" idx="3"/>
-            <a:endCxn id="62" idx="1"/>
-          </p:cNvCxnSpPr>
-          <p:nvPr/>
-        </p:nvCxnSpPr>
-        <p:spPr>
-          <a:xfrm>
-            <a:off x="4499933" y="6072415"/>
-            <a:ext cx="1352185" cy="0"/>
-          </a:xfrm>
-          <a:prstGeom prst="straightConnector1">
-            <a:avLst/>
-          </a:prstGeom>
-          <a:ln>
-            <a:tailEnd type="arrow"/>
-          </a:ln>
-        </p:spPr>
-        <p:style>
-          <a:lnRef idx="2">
-            <a:schemeClr val="accent1"/>
-          </a:lnRef>
-          <a:fillRef idx="0">
-            <a:schemeClr val="accent1"/>
-          </a:fillRef>
-          <a:effectRef idx="1">
-            <a:schemeClr val="accent1"/>
-          </a:effectRef>
-          <a:fontRef idx="minor">
-            <a:schemeClr val="tx1"/>
-          </a:fontRef>
-        </p:style>
-      </p:cxnSp>
-      <p:sp>
-        <p:nvSpPr>
-          <p:cNvPr id="66" name="TextBox 65"/>
-          <p:cNvSpPr txBox="1"/>
-          <p:nvPr/>
-        </p:nvSpPr>
-        <p:spPr>
-          <a:xfrm>
-            <a:off x="5159767" y="1370134"/>
-            <a:ext cx="3180522" cy="2978163"/>
-          </a:xfrm>
-          <a:prstGeom prst="rect">
-            <a:avLst/>
-          </a:prstGeom>
-          <a:noFill/>
-        </p:spPr>
-        <p:txBody>
-          <a:bodyPr wrap="square" rtlCol="0">
-            <a:noAutofit/>
-          </a:bodyPr>
-          <a:lstStyle/>
-          <a:p>
+              <a:t>Move data is correct</a:t>
+            </a:r>
+          </a:p>
+          <a:p>
+            <a:pPr lvl="1"/>
             <a:r>
               <a:rPr lang="en-US" dirty="0" smtClean="0"/>
-              <a:t>This state has many entrances but entering this state will always result in the game scene being displayed with the current move data. </a:t>
-            </a:r>
-            <a:endParaRPr lang="en-US" dirty="0"/>
-          </a:p>
-        </p:txBody>
-      </p:sp>
-      <p:sp>
-        <p:nvSpPr>
-          <p:cNvPr id="67" name="Connector 66"/>
-          <p:cNvSpPr/>
-          <p:nvPr/>
-        </p:nvSpPr>
-        <p:spPr>
-          <a:xfrm>
-            <a:off x="1284246" y="3228354"/>
-            <a:ext cx="177281" cy="177281"/>
-          </a:xfrm>
-          <a:prstGeom prst="flowChartConnector">
-            <a:avLst/>
-          </a:prstGeom>
-        </p:spPr>
-        <p:style>
-          <a:lnRef idx="1">
-            <a:schemeClr val="accent1"/>
-          </a:lnRef>
-          <a:fillRef idx="3">
-            <a:schemeClr val="accent1"/>
-          </a:fillRef>
-          <a:effectRef idx="2">
-            <a:schemeClr val="accent1"/>
-          </a:effectRef>
-          <a:fontRef idx="minor">
-            <a:schemeClr val="lt1"/>
-          </a:fontRef>
-        </p:style>
-        <p:txBody>
-          <a:bodyPr rtlCol="0" anchor="ctr"/>
-          <a:lstStyle/>
-          <a:p>
-            <a:pPr algn="ctr"/>
-            <a:endParaRPr lang="en-US"/>
-          </a:p>
-        </p:txBody>
-      </p:sp>
-      <p:cxnSp>
-        <p:nvCxnSpPr>
-          <p:cNvPr id="72" name="Elbow Connector 71"/>
-          <p:cNvCxnSpPr>
-            <a:stCxn id="12" idx="2"/>
-            <a:endCxn id="67" idx="6"/>
-          </p:cNvCxnSpPr>
-          <p:nvPr/>
-        </p:nvCxnSpPr>
-        <p:spPr>
-          <a:xfrm rot="5400000">
-            <a:off x="2178520" y="1800161"/>
-            <a:ext cx="799842" cy="2233827"/>
-          </a:xfrm>
-          <a:prstGeom prst="bentConnector2">
-            <a:avLst/>
-          </a:prstGeom>
-          <a:ln>
-            <a:tailEnd type="arrow"/>
-          </a:ln>
-        </p:spPr>
-        <p:style>
-          <a:lnRef idx="2">
-            <a:schemeClr val="accent1"/>
-          </a:lnRef>
-          <a:fillRef idx="0">
-            <a:schemeClr val="accent1"/>
-          </a:fillRef>
-          <a:effectRef idx="1">
-            <a:schemeClr val="accent1"/>
-          </a:effectRef>
-          <a:fontRef idx="minor">
-            <a:schemeClr val="tx1"/>
-          </a:fontRef>
-        </p:style>
-      </p:cxnSp>
-      <p:cxnSp>
-        <p:nvCxnSpPr>
-          <p:cNvPr id="74" name="Straight Arrow Connector 73"/>
-          <p:cNvCxnSpPr>
-            <a:stCxn id="13" idx="2"/>
-            <a:endCxn id="67" idx="0"/>
-          </p:cNvCxnSpPr>
-          <p:nvPr/>
-        </p:nvCxnSpPr>
-        <p:spPr>
-          <a:xfrm>
-            <a:off x="1372723" y="2923341"/>
-            <a:ext cx="164" cy="305013"/>
-          </a:xfrm>
-          <a:prstGeom prst="straightConnector1">
-            <a:avLst/>
-          </a:prstGeom>
-          <a:ln>
-            <a:tailEnd type="arrow"/>
-          </a:ln>
-        </p:spPr>
-        <p:style>
-          <a:lnRef idx="2">
-            <a:schemeClr val="accent1"/>
-          </a:lnRef>
-          <a:fillRef idx="0">
-            <a:schemeClr val="accent1"/>
-          </a:fillRef>
-          <a:effectRef idx="1">
-            <a:schemeClr val="accent1"/>
-          </a:effectRef>
-          <a:fontRef idx="minor">
-            <a:schemeClr val="tx1"/>
-          </a:fontRef>
-        </p:style>
-      </p:cxnSp>
-      <p:cxnSp>
-        <p:nvCxnSpPr>
-          <p:cNvPr id="76" name="Straight Arrow Connector 75"/>
-          <p:cNvCxnSpPr>
-            <a:stCxn id="67" idx="4"/>
-            <a:endCxn id="47" idx="0"/>
-          </p:cNvCxnSpPr>
-          <p:nvPr/>
-        </p:nvCxnSpPr>
-        <p:spPr>
-          <a:xfrm flipH="1">
-            <a:off x="1365543" y="3405635"/>
-            <a:ext cx="7344" cy="210380"/>
-          </a:xfrm>
-          <a:prstGeom prst="straightConnector1">
-            <a:avLst/>
-          </a:prstGeom>
-          <a:ln>
-            <a:tailEnd type="arrow"/>
-          </a:ln>
-        </p:spPr>
-        <p:style>
-          <a:lnRef idx="2">
-            <a:schemeClr val="accent1"/>
-          </a:lnRef>
-          <a:fillRef idx="0">
-            <a:schemeClr val="accent1"/>
-          </a:fillRef>
-          <a:effectRef idx="1">
-            <a:schemeClr val="accent1"/>
-          </a:effectRef>
-          <a:fontRef idx="minor">
-            <a:schemeClr val="tx1"/>
-          </a:fontRef>
-        </p:style>
-      </p:cxnSp>
+              <a:t>Present scene will correctly transition to the game scene no matter what scene we are currently in when entering this state.</a:t>
+            </a:r>
+          </a:p>
+        </p:txBody>
+      </p:sp>
     </p:spTree>
     <p:extLst>
       <p:ext uri="{BB962C8B-B14F-4D97-AF65-F5344CB8AC3E}">
-        <p14:creationId xmlns:p14="http://schemas.microsoft.com/office/powerpoint/2010/main" val="988199851"/>
+        <p14:creationId xmlns:p14="http://schemas.microsoft.com/office/powerpoint/2010/main" val="996580574"/>
       </p:ext>
     </p:extLst>
   </p:cSld>
@@ -5321,6 +5251,879 @@
         </p:nvSpPr>
         <p:spPr>
           <a:xfrm>
+            <a:off x="457200" y="0"/>
+            <a:ext cx="8229600" cy="629274"/>
+          </a:xfrm>
+        </p:spPr>
+        <p:txBody>
+          <a:bodyPr>
+            <a:normAutofit fontScale="90000"/>
+          </a:bodyPr>
+          <a:lstStyle/>
+          <a:p>
+            <a:r>
+              <a:rPr lang="en-US" dirty="0" smtClean="0"/>
+              <a:t>Idle State Flow</a:t>
+            </a:r>
+            <a:endParaRPr lang="en-US" dirty="0"/>
+          </a:p>
+        </p:txBody>
+      </p:sp>
+      <p:sp>
+        <p:nvSpPr>
+          <p:cNvPr id="10" name="Preparation 9"/>
+          <p:cNvSpPr/>
+          <p:nvPr/>
+        </p:nvSpPr>
+        <p:spPr>
+          <a:xfrm>
+            <a:off x="760808" y="296080"/>
+            <a:ext cx="1224158" cy="666387"/>
+          </a:xfrm>
+          <a:prstGeom prst="flowChartPreparation">
+            <a:avLst/>
+          </a:prstGeom>
+        </p:spPr>
+        <p:style>
+          <a:lnRef idx="1">
+            <a:schemeClr val="accent1"/>
+          </a:lnRef>
+          <a:fillRef idx="3">
+            <a:schemeClr val="accent1"/>
+          </a:fillRef>
+          <a:effectRef idx="2">
+            <a:schemeClr val="accent1"/>
+          </a:effectRef>
+          <a:fontRef idx="minor">
+            <a:schemeClr val="lt1"/>
+          </a:fontRef>
+        </p:style>
+        <p:txBody>
+          <a:bodyPr rtlCol="0" anchor="ctr"/>
+          <a:lstStyle/>
+          <a:p>
+            <a:pPr algn="ctr"/>
+            <a:r>
+              <a:rPr lang="en-US" sz="1600" dirty="0" smtClean="0"/>
+              <a:t>START</a:t>
+            </a:r>
+            <a:endParaRPr lang="en-US" sz="1600" dirty="0"/>
+          </a:p>
+        </p:txBody>
+      </p:sp>
+      <p:sp>
+        <p:nvSpPr>
+          <p:cNvPr id="12" name="Process 11"/>
+          <p:cNvSpPr/>
+          <p:nvPr/>
+        </p:nvSpPr>
+        <p:spPr>
+          <a:xfrm>
+            <a:off x="3031792" y="1864964"/>
+            <a:ext cx="1327124" cy="652189"/>
+          </a:xfrm>
+          <a:prstGeom prst="flowChartProcess">
+            <a:avLst/>
+          </a:prstGeom>
+        </p:spPr>
+        <p:style>
+          <a:lnRef idx="1">
+            <a:schemeClr val="accent1"/>
+          </a:lnRef>
+          <a:fillRef idx="3">
+            <a:schemeClr val="accent1"/>
+          </a:fillRef>
+          <a:effectRef idx="2">
+            <a:schemeClr val="accent1"/>
+          </a:effectRef>
+          <a:fontRef idx="minor">
+            <a:schemeClr val="lt1"/>
+          </a:fontRef>
+        </p:style>
+        <p:txBody>
+          <a:bodyPr rtlCol="0" anchor="ctr"/>
+          <a:lstStyle/>
+          <a:p>
+            <a:pPr algn="ctr"/>
+            <a:r>
+              <a:rPr lang="en-US" dirty="0" smtClean="0"/>
+              <a:t>Load Game Scene</a:t>
+            </a:r>
+            <a:endParaRPr lang="en-US" dirty="0"/>
+          </a:p>
+        </p:txBody>
+      </p:sp>
+      <p:sp>
+        <p:nvSpPr>
+          <p:cNvPr id="13" name="Decision 12"/>
+          <p:cNvSpPr/>
+          <p:nvPr/>
+        </p:nvSpPr>
+        <p:spPr>
+          <a:xfrm>
+            <a:off x="440089" y="1458776"/>
+            <a:ext cx="1865267" cy="1464565"/>
+          </a:xfrm>
+          <a:prstGeom prst="flowChartDecision">
+            <a:avLst/>
+          </a:prstGeom>
+        </p:spPr>
+        <p:style>
+          <a:lnRef idx="1">
+            <a:schemeClr val="accent1"/>
+          </a:lnRef>
+          <a:fillRef idx="3">
+            <a:schemeClr val="accent1"/>
+          </a:fillRef>
+          <a:effectRef idx="2">
+            <a:schemeClr val="accent1"/>
+          </a:effectRef>
+          <a:fontRef idx="minor">
+            <a:schemeClr val="lt1"/>
+          </a:fontRef>
+        </p:style>
+        <p:txBody>
+          <a:bodyPr rtlCol="0" anchor="ctr"/>
+          <a:lstStyle/>
+          <a:p>
+            <a:pPr algn="ctr"/>
+            <a:r>
+              <a:rPr lang="en-US" dirty="0" smtClean="0"/>
+              <a:t>Game Scene loaded?</a:t>
+            </a:r>
+            <a:endParaRPr lang="en-US" dirty="0"/>
+          </a:p>
+        </p:txBody>
+      </p:sp>
+      <p:cxnSp>
+        <p:nvCxnSpPr>
+          <p:cNvPr id="15" name="Straight Arrow Connector 14"/>
+          <p:cNvCxnSpPr>
+            <a:stCxn id="13" idx="3"/>
+            <a:endCxn id="12" idx="1"/>
+          </p:cNvCxnSpPr>
+          <p:nvPr/>
+        </p:nvCxnSpPr>
+        <p:spPr>
+          <a:xfrm>
+            <a:off x="2305356" y="2191059"/>
+            <a:ext cx="726436" cy="0"/>
+          </a:xfrm>
+          <a:prstGeom prst="straightConnector1">
+            <a:avLst/>
+          </a:prstGeom>
+          <a:ln>
+            <a:tailEnd type="arrow"/>
+          </a:ln>
+        </p:spPr>
+        <p:style>
+          <a:lnRef idx="2">
+            <a:schemeClr val="accent1"/>
+          </a:lnRef>
+          <a:fillRef idx="0">
+            <a:schemeClr val="accent1"/>
+          </a:fillRef>
+          <a:effectRef idx="1">
+            <a:schemeClr val="accent1"/>
+          </a:effectRef>
+          <a:fontRef idx="minor">
+            <a:schemeClr val="tx1"/>
+          </a:fontRef>
+        </p:style>
+      </p:cxnSp>
+      <p:sp>
+        <p:nvSpPr>
+          <p:cNvPr id="16" name="TextBox 15"/>
+          <p:cNvSpPr txBox="1"/>
+          <p:nvPr/>
+        </p:nvSpPr>
+        <p:spPr>
+          <a:xfrm>
+            <a:off x="2385443" y="2099366"/>
+            <a:ext cx="486506" cy="369332"/>
+          </a:xfrm>
+          <a:prstGeom prst="rect">
+            <a:avLst/>
+          </a:prstGeom>
+          <a:noFill/>
+        </p:spPr>
+        <p:txBody>
+          <a:bodyPr wrap="none" rtlCol="0">
+            <a:spAutoFit/>
+          </a:bodyPr>
+          <a:lstStyle/>
+          <a:p>
+            <a:r>
+              <a:rPr lang="en-US" dirty="0" smtClean="0"/>
+              <a:t>NO</a:t>
+            </a:r>
+            <a:endParaRPr lang="en-US" dirty="0"/>
+          </a:p>
+        </p:txBody>
+      </p:sp>
+      <p:cxnSp>
+        <p:nvCxnSpPr>
+          <p:cNvPr id="23" name="Straight Arrow Connector 22" title="YES"/>
+          <p:cNvCxnSpPr>
+            <a:stCxn id="10" idx="2"/>
+            <a:endCxn id="13" idx="0"/>
+          </p:cNvCxnSpPr>
+          <p:nvPr/>
+        </p:nvCxnSpPr>
+        <p:spPr>
+          <a:xfrm flipH="1">
+            <a:off x="1372723" y="962467"/>
+            <a:ext cx="164" cy="496309"/>
+          </a:xfrm>
+          <a:prstGeom prst="straightConnector1">
+            <a:avLst/>
+          </a:prstGeom>
+          <a:ln>
+            <a:tailEnd type="arrow"/>
+          </a:ln>
+        </p:spPr>
+        <p:style>
+          <a:lnRef idx="2">
+            <a:schemeClr val="accent1"/>
+          </a:lnRef>
+          <a:fillRef idx="0">
+            <a:schemeClr val="accent1"/>
+          </a:fillRef>
+          <a:effectRef idx="1">
+            <a:schemeClr val="accent1"/>
+          </a:effectRef>
+          <a:fontRef idx="minor">
+            <a:schemeClr val="tx1"/>
+          </a:fontRef>
+        </p:style>
+      </p:cxnSp>
+      <p:sp>
+        <p:nvSpPr>
+          <p:cNvPr id="36" name="TextBox 35"/>
+          <p:cNvSpPr txBox="1"/>
+          <p:nvPr/>
+        </p:nvSpPr>
+        <p:spPr>
+          <a:xfrm>
+            <a:off x="1461363" y="2947663"/>
+            <a:ext cx="518091" cy="369332"/>
+          </a:xfrm>
+          <a:prstGeom prst="rect">
+            <a:avLst/>
+          </a:prstGeom>
+          <a:noFill/>
+        </p:spPr>
+        <p:txBody>
+          <a:bodyPr wrap="none" rtlCol="0">
+            <a:spAutoFit/>
+          </a:bodyPr>
+          <a:lstStyle/>
+          <a:p>
+            <a:r>
+              <a:rPr lang="en-US" dirty="0" smtClean="0"/>
+              <a:t>YES</a:t>
+            </a:r>
+            <a:endParaRPr lang="en-US" dirty="0"/>
+          </a:p>
+        </p:txBody>
+      </p:sp>
+      <p:sp>
+        <p:nvSpPr>
+          <p:cNvPr id="46" name="Process 45"/>
+          <p:cNvSpPr/>
+          <p:nvPr/>
+        </p:nvSpPr>
+        <p:spPr>
+          <a:xfrm>
+            <a:off x="3031792" y="4022202"/>
+            <a:ext cx="1327124" cy="652189"/>
+          </a:xfrm>
+          <a:prstGeom prst="flowChartProcess">
+            <a:avLst/>
+          </a:prstGeom>
+        </p:spPr>
+        <p:style>
+          <a:lnRef idx="1">
+            <a:schemeClr val="accent1"/>
+          </a:lnRef>
+          <a:fillRef idx="3">
+            <a:schemeClr val="accent1"/>
+          </a:fillRef>
+          <a:effectRef idx="2">
+            <a:schemeClr val="accent1"/>
+          </a:effectRef>
+          <a:fontRef idx="minor">
+            <a:schemeClr val="lt1"/>
+          </a:fontRef>
+        </p:style>
+        <p:txBody>
+          <a:bodyPr rtlCol="0" anchor="ctr"/>
+          <a:lstStyle/>
+          <a:p>
+            <a:pPr algn="ctr"/>
+            <a:r>
+              <a:rPr lang="en-US" sz="1600" dirty="0" smtClean="0"/>
+              <a:t>Present Game Scene</a:t>
+            </a:r>
+            <a:endParaRPr lang="en-US" sz="1600" dirty="0"/>
+          </a:p>
+        </p:txBody>
+      </p:sp>
+      <p:sp>
+        <p:nvSpPr>
+          <p:cNvPr id="47" name="Decision 46"/>
+          <p:cNvSpPr/>
+          <p:nvPr/>
+        </p:nvSpPr>
+        <p:spPr>
+          <a:xfrm>
+            <a:off x="432909" y="3616015"/>
+            <a:ext cx="1865267" cy="1464565"/>
+          </a:xfrm>
+          <a:prstGeom prst="flowChartDecision">
+            <a:avLst/>
+          </a:prstGeom>
+        </p:spPr>
+        <p:style>
+          <a:lnRef idx="1">
+            <a:schemeClr val="accent1"/>
+          </a:lnRef>
+          <a:fillRef idx="3">
+            <a:schemeClr val="accent1"/>
+          </a:fillRef>
+          <a:effectRef idx="2">
+            <a:schemeClr val="accent1"/>
+          </a:effectRef>
+          <a:fontRef idx="minor">
+            <a:schemeClr val="lt1"/>
+          </a:fontRef>
+        </p:style>
+        <p:txBody>
+          <a:bodyPr rtlCol="0" anchor="ctr"/>
+          <a:lstStyle/>
+          <a:p>
+            <a:pPr algn="ctr"/>
+            <a:r>
+              <a:rPr lang="en-US" sz="1400" dirty="0" smtClean="0"/>
+              <a:t>Is current scene == game scene?</a:t>
+            </a:r>
+            <a:endParaRPr lang="en-US" sz="1400" dirty="0"/>
+          </a:p>
+        </p:txBody>
+      </p:sp>
+      <p:cxnSp>
+        <p:nvCxnSpPr>
+          <p:cNvPr id="48" name="Straight Arrow Connector 47"/>
+          <p:cNvCxnSpPr>
+            <a:stCxn id="47" idx="3"/>
+            <a:endCxn id="46" idx="1"/>
+          </p:cNvCxnSpPr>
+          <p:nvPr/>
+        </p:nvCxnSpPr>
+        <p:spPr>
+          <a:xfrm flipV="1">
+            <a:off x="2298176" y="4348297"/>
+            <a:ext cx="733616" cy="1"/>
+          </a:xfrm>
+          <a:prstGeom prst="straightConnector1">
+            <a:avLst/>
+          </a:prstGeom>
+          <a:ln>
+            <a:tailEnd type="arrow"/>
+          </a:ln>
+        </p:spPr>
+        <p:style>
+          <a:lnRef idx="2">
+            <a:schemeClr val="accent1"/>
+          </a:lnRef>
+          <a:fillRef idx="0">
+            <a:schemeClr val="accent1"/>
+          </a:fillRef>
+          <a:effectRef idx="1">
+            <a:schemeClr val="accent1"/>
+          </a:effectRef>
+          <a:fontRef idx="minor">
+            <a:schemeClr val="tx1"/>
+          </a:fontRef>
+        </p:style>
+      </p:cxnSp>
+      <p:sp>
+        <p:nvSpPr>
+          <p:cNvPr id="49" name="TextBox 48"/>
+          <p:cNvSpPr txBox="1"/>
+          <p:nvPr/>
+        </p:nvSpPr>
+        <p:spPr>
+          <a:xfrm>
+            <a:off x="2385443" y="3978966"/>
+            <a:ext cx="486506" cy="369332"/>
+          </a:xfrm>
+          <a:prstGeom prst="rect">
+            <a:avLst/>
+          </a:prstGeom>
+          <a:noFill/>
+        </p:spPr>
+        <p:txBody>
+          <a:bodyPr wrap="none" rtlCol="0">
+            <a:spAutoFit/>
+          </a:bodyPr>
+          <a:lstStyle/>
+          <a:p>
+            <a:r>
+              <a:rPr lang="en-US" dirty="0" smtClean="0"/>
+              <a:t>NO</a:t>
+            </a:r>
+            <a:endParaRPr lang="en-US" dirty="0"/>
+          </a:p>
+        </p:txBody>
+      </p:sp>
+      <p:sp>
+        <p:nvSpPr>
+          <p:cNvPr id="51" name="TextBox 50"/>
+          <p:cNvSpPr txBox="1"/>
+          <p:nvPr/>
+        </p:nvSpPr>
+        <p:spPr>
+          <a:xfrm>
+            <a:off x="1372722" y="5703083"/>
+            <a:ext cx="518091" cy="369332"/>
+          </a:xfrm>
+          <a:prstGeom prst="rect">
+            <a:avLst/>
+          </a:prstGeom>
+          <a:noFill/>
+        </p:spPr>
+        <p:txBody>
+          <a:bodyPr wrap="none" rtlCol="0">
+            <a:spAutoFit/>
+          </a:bodyPr>
+          <a:lstStyle/>
+          <a:p>
+            <a:r>
+              <a:rPr lang="en-US" dirty="0" smtClean="0"/>
+              <a:t>YES</a:t>
+            </a:r>
+            <a:endParaRPr lang="en-US" dirty="0"/>
+          </a:p>
+        </p:txBody>
+      </p:sp>
+      <p:sp>
+        <p:nvSpPr>
+          <p:cNvPr id="53" name="Display 52"/>
+          <p:cNvSpPr/>
+          <p:nvPr/>
+        </p:nvSpPr>
+        <p:spPr>
+          <a:xfrm>
+            <a:off x="2871949" y="5527040"/>
+            <a:ext cx="1627984" cy="1090750"/>
+          </a:xfrm>
+          <a:prstGeom prst="flowChartDisplay">
+            <a:avLst/>
+          </a:prstGeom>
+        </p:spPr>
+        <p:style>
+          <a:lnRef idx="1">
+            <a:schemeClr val="accent1"/>
+          </a:lnRef>
+          <a:fillRef idx="3">
+            <a:schemeClr val="accent1"/>
+          </a:fillRef>
+          <a:effectRef idx="2">
+            <a:schemeClr val="accent1"/>
+          </a:effectRef>
+          <a:fontRef idx="minor">
+            <a:schemeClr val="lt1"/>
+          </a:fontRef>
+        </p:style>
+        <p:txBody>
+          <a:bodyPr rtlCol="0" anchor="ctr"/>
+          <a:lstStyle/>
+          <a:p>
+            <a:pPr algn="ctr"/>
+            <a:r>
+              <a:rPr lang="en-US" sz="1600" dirty="0" smtClean="0"/>
+              <a:t>Redisplay screen</a:t>
+            </a:r>
+          </a:p>
+          <a:p>
+            <a:pPr algn="ctr"/>
+            <a:r>
+              <a:rPr lang="en-US" sz="1600" dirty="0" smtClean="0"/>
+              <a:t>w/ current move</a:t>
+            </a:r>
+            <a:endParaRPr lang="en-US" sz="1600" dirty="0"/>
+          </a:p>
+        </p:txBody>
+      </p:sp>
+      <p:cxnSp>
+        <p:nvCxnSpPr>
+          <p:cNvPr id="59" name="Elbow Connector 58"/>
+          <p:cNvCxnSpPr>
+            <a:stCxn id="47" idx="2"/>
+            <a:endCxn id="53" idx="1"/>
+          </p:cNvCxnSpPr>
+          <p:nvPr/>
+        </p:nvCxnSpPr>
+        <p:spPr>
+          <a:xfrm rot="16200000" flipH="1">
+            <a:off x="1622829" y="4823294"/>
+            <a:ext cx="991835" cy="1506406"/>
+          </a:xfrm>
+          <a:prstGeom prst="bentConnector2">
+            <a:avLst/>
+          </a:prstGeom>
+          <a:ln>
+            <a:tailEnd type="arrow"/>
+          </a:ln>
+        </p:spPr>
+        <p:style>
+          <a:lnRef idx="2">
+            <a:schemeClr val="accent1"/>
+          </a:lnRef>
+          <a:fillRef idx="0">
+            <a:schemeClr val="accent1"/>
+          </a:fillRef>
+          <a:effectRef idx="1">
+            <a:schemeClr val="accent1"/>
+          </a:effectRef>
+          <a:fontRef idx="minor">
+            <a:schemeClr val="tx1"/>
+          </a:fontRef>
+        </p:style>
+      </p:cxnSp>
+      <p:cxnSp>
+        <p:nvCxnSpPr>
+          <p:cNvPr id="61" name="Straight Arrow Connector 60"/>
+          <p:cNvCxnSpPr>
+            <a:stCxn id="46" idx="2"/>
+            <a:endCxn id="53" idx="0"/>
+          </p:cNvCxnSpPr>
+          <p:nvPr/>
+        </p:nvCxnSpPr>
+        <p:spPr>
+          <a:xfrm flipH="1">
+            <a:off x="3685941" y="4674391"/>
+            <a:ext cx="9413" cy="852649"/>
+          </a:xfrm>
+          <a:prstGeom prst="straightConnector1">
+            <a:avLst/>
+          </a:prstGeom>
+          <a:ln>
+            <a:tailEnd type="arrow"/>
+          </a:ln>
+        </p:spPr>
+        <p:style>
+          <a:lnRef idx="2">
+            <a:schemeClr val="accent1"/>
+          </a:lnRef>
+          <a:fillRef idx="0">
+            <a:schemeClr val="accent1"/>
+          </a:fillRef>
+          <a:effectRef idx="1">
+            <a:schemeClr val="accent1"/>
+          </a:effectRef>
+          <a:fontRef idx="minor">
+            <a:schemeClr val="tx1"/>
+          </a:fontRef>
+        </p:style>
+      </p:cxnSp>
+      <p:sp>
+        <p:nvSpPr>
+          <p:cNvPr id="62" name="Terminator 61"/>
+          <p:cNvSpPr/>
+          <p:nvPr/>
+        </p:nvSpPr>
+        <p:spPr>
+          <a:xfrm>
+            <a:off x="5852118" y="5723710"/>
+            <a:ext cx="2113364" cy="697410"/>
+          </a:xfrm>
+          <a:prstGeom prst="flowChartTerminator">
+            <a:avLst/>
+          </a:prstGeom>
+        </p:spPr>
+        <p:style>
+          <a:lnRef idx="1">
+            <a:schemeClr val="accent1"/>
+          </a:lnRef>
+          <a:fillRef idx="3">
+            <a:schemeClr val="accent1"/>
+          </a:fillRef>
+          <a:effectRef idx="2">
+            <a:schemeClr val="accent1"/>
+          </a:effectRef>
+          <a:fontRef idx="minor">
+            <a:schemeClr val="lt1"/>
+          </a:fontRef>
+        </p:style>
+        <p:txBody>
+          <a:bodyPr rtlCol="0" anchor="ctr"/>
+          <a:lstStyle/>
+          <a:p>
+            <a:pPr algn="ctr"/>
+            <a:r>
+              <a:rPr lang="en-US" dirty="0" smtClean="0"/>
+              <a:t>END</a:t>
+            </a:r>
+            <a:endParaRPr lang="en-US" dirty="0"/>
+          </a:p>
+        </p:txBody>
+      </p:sp>
+      <p:cxnSp>
+        <p:nvCxnSpPr>
+          <p:cNvPr id="65" name="Straight Arrow Connector 64"/>
+          <p:cNvCxnSpPr>
+            <a:stCxn id="53" idx="3"/>
+            <a:endCxn id="62" idx="1"/>
+          </p:cNvCxnSpPr>
+          <p:nvPr/>
+        </p:nvCxnSpPr>
+        <p:spPr>
+          <a:xfrm>
+            <a:off x="4499933" y="6072415"/>
+            <a:ext cx="1352185" cy="0"/>
+          </a:xfrm>
+          <a:prstGeom prst="straightConnector1">
+            <a:avLst/>
+          </a:prstGeom>
+          <a:ln>
+            <a:tailEnd type="arrow"/>
+          </a:ln>
+        </p:spPr>
+        <p:style>
+          <a:lnRef idx="2">
+            <a:schemeClr val="accent1"/>
+          </a:lnRef>
+          <a:fillRef idx="0">
+            <a:schemeClr val="accent1"/>
+          </a:fillRef>
+          <a:effectRef idx="1">
+            <a:schemeClr val="accent1"/>
+          </a:effectRef>
+          <a:fontRef idx="minor">
+            <a:schemeClr val="tx1"/>
+          </a:fontRef>
+        </p:style>
+      </p:cxnSp>
+      <p:sp>
+        <p:nvSpPr>
+          <p:cNvPr id="66" name="TextBox 65"/>
+          <p:cNvSpPr txBox="1"/>
+          <p:nvPr/>
+        </p:nvSpPr>
+        <p:spPr>
+          <a:xfrm>
+            <a:off x="5159767" y="1370134"/>
+            <a:ext cx="3180522" cy="2978163"/>
+          </a:xfrm>
+          <a:prstGeom prst="rect">
+            <a:avLst/>
+          </a:prstGeom>
+          <a:noFill/>
+        </p:spPr>
+        <p:txBody>
+          <a:bodyPr wrap="square" rtlCol="0">
+            <a:noAutofit/>
+          </a:bodyPr>
+          <a:lstStyle/>
+          <a:p>
+            <a:r>
+              <a:rPr lang="en-US" dirty="0" smtClean="0"/>
+              <a:t>This state has many entrances but entering this state will always result in the game scene being displayed with the current move data. </a:t>
+            </a:r>
+            <a:endParaRPr lang="en-US" dirty="0"/>
+          </a:p>
+        </p:txBody>
+      </p:sp>
+      <p:sp>
+        <p:nvSpPr>
+          <p:cNvPr id="67" name="Connector 66"/>
+          <p:cNvSpPr/>
+          <p:nvPr/>
+        </p:nvSpPr>
+        <p:spPr>
+          <a:xfrm>
+            <a:off x="1284246" y="3228354"/>
+            <a:ext cx="177281" cy="177281"/>
+          </a:xfrm>
+          <a:prstGeom prst="flowChartConnector">
+            <a:avLst/>
+          </a:prstGeom>
+        </p:spPr>
+        <p:style>
+          <a:lnRef idx="1">
+            <a:schemeClr val="accent1"/>
+          </a:lnRef>
+          <a:fillRef idx="3">
+            <a:schemeClr val="accent1"/>
+          </a:fillRef>
+          <a:effectRef idx="2">
+            <a:schemeClr val="accent1"/>
+          </a:effectRef>
+          <a:fontRef idx="minor">
+            <a:schemeClr val="lt1"/>
+          </a:fontRef>
+        </p:style>
+        <p:txBody>
+          <a:bodyPr rtlCol="0" anchor="ctr"/>
+          <a:lstStyle/>
+          <a:p>
+            <a:pPr algn="ctr"/>
+            <a:endParaRPr lang="en-US"/>
+          </a:p>
+        </p:txBody>
+      </p:sp>
+      <p:cxnSp>
+        <p:nvCxnSpPr>
+          <p:cNvPr id="72" name="Elbow Connector 71"/>
+          <p:cNvCxnSpPr>
+            <a:stCxn id="12" idx="2"/>
+            <a:endCxn id="67" idx="6"/>
+          </p:cNvCxnSpPr>
+          <p:nvPr/>
+        </p:nvCxnSpPr>
+        <p:spPr>
+          <a:xfrm rot="5400000">
+            <a:off x="2178520" y="1800161"/>
+            <a:ext cx="799842" cy="2233827"/>
+          </a:xfrm>
+          <a:prstGeom prst="bentConnector2">
+            <a:avLst/>
+          </a:prstGeom>
+          <a:ln>
+            <a:tailEnd type="arrow"/>
+          </a:ln>
+        </p:spPr>
+        <p:style>
+          <a:lnRef idx="2">
+            <a:schemeClr val="accent1"/>
+          </a:lnRef>
+          <a:fillRef idx="0">
+            <a:schemeClr val="accent1"/>
+          </a:fillRef>
+          <a:effectRef idx="1">
+            <a:schemeClr val="accent1"/>
+          </a:effectRef>
+          <a:fontRef idx="minor">
+            <a:schemeClr val="tx1"/>
+          </a:fontRef>
+        </p:style>
+      </p:cxnSp>
+      <p:cxnSp>
+        <p:nvCxnSpPr>
+          <p:cNvPr id="74" name="Straight Arrow Connector 73"/>
+          <p:cNvCxnSpPr>
+            <a:stCxn id="13" idx="2"/>
+            <a:endCxn id="67" idx="0"/>
+          </p:cNvCxnSpPr>
+          <p:nvPr/>
+        </p:nvCxnSpPr>
+        <p:spPr>
+          <a:xfrm>
+            <a:off x="1372723" y="2923341"/>
+            <a:ext cx="164" cy="305013"/>
+          </a:xfrm>
+          <a:prstGeom prst="straightConnector1">
+            <a:avLst/>
+          </a:prstGeom>
+          <a:ln>
+            <a:tailEnd type="arrow"/>
+          </a:ln>
+        </p:spPr>
+        <p:style>
+          <a:lnRef idx="2">
+            <a:schemeClr val="accent1"/>
+          </a:lnRef>
+          <a:fillRef idx="0">
+            <a:schemeClr val="accent1"/>
+          </a:fillRef>
+          <a:effectRef idx="1">
+            <a:schemeClr val="accent1"/>
+          </a:effectRef>
+          <a:fontRef idx="minor">
+            <a:schemeClr val="tx1"/>
+          </a:fontRef>
+        </p:style>
+      </p:cxnSp>
+      <p:cxnSp>
+        <p:nvCxnSpPr>
+          <p:cNvPr id="76" name="Straight Arrow Connector 75"/>
+          <p:cNvCxnSpPr>
+            <a:stCxn id="67" idx="4"/>
+            <a:endCxn id="47" idx="0"/>
+          </p:cNvCxnSpPr>
+          <p:nvPr/>
+        </p:nvCxnSpPr>
+        <p:spPr>
+          <a:xfrm flipH="1">
+            <a:off x="1365543" y="3405635"/>
+            <a:ext cx="7344" cy="210380"/>
+          </a:xfrm>
+          <a:prstGeom prst="straightConnector1">
+            <a:avLst/>
+          </a:prstGeom>
+          <a:ln>
+            <a:tailEnd type="arrow"/>
+          </a:ln>
+        </p:spPr>
+        <p:style>
+          <a:lnRef idx="2">
+            <a:schemeClr val="accent1"/>
+          </a:lnRef>
+          <a:fillRef idx="0">
+            <a:schemeClr val="accent1"/>
+          </a:fillRef>
+          <a:effectRef idx="1">
+            <a:schemeClr val="accent1"/>
+          </a:effectRef>
+          <a:fontRef idx="minor">
+            <a:schemeClr val="tx1"/>
+          </a:fontRef>
+        </p:style>
+      </p:cxnSp>
+    </p:spTree>
+    <p:extLst>
+      <p:ext uri="{BB962C8B-B14F-4D97-AF65-F5344CB8AC3E}">
+        <p14:creationId xmlns:p14="http://schemas.microsoft.com/office/powerpoint/2010/main" val="988199851"/>
+      </p:ext>
+    </p:extLst>
+  </p:cSld>
+  <p:clrMapOvr>
+    <a:masterClrMapping/>
+  </p:clrMapOvr>
+</p:sld>
+</file>
+
+<file path=ppt/slides/slide6.xml><?xml version="1.0" encoding="utf-8"?>
+<p:sld xmlns:a="http://schemas.openxmlformats.org/drawingml/2006/main" xmlns:r="http://schemas.openxmlformats.org/officeDocument/2006/relationships" xmlns:p="http://schemas.openxmlformats.org/presentationml/2006/main">
+  <p:cSld>
+    <p:spTree>
+      <p:nvGrpSpPr>
+        <p:cNvPr id="1" name=""/>
+        <p:cNvGrpSpPr/>
+        <p:nvPr/>
+      </p:nvGrpSpPr>
+      <p:grpSpPr>
+        <a:xfrm>
+          <a:off x="0" y="0"/>
+          <a:ext cx="0" cy="0"/>
+          <a:chOff x="0" y="0"/>
+          <a:chExt cx="0" cy="0"/>
+        </a:xfrm>
+      </p:grpSpPr>
+      <p:sp>
+        <p:nvSpPr>
+          <p:cNvPr id="2" name="Title 1"/>
+          <p:cNvSpPr>
+            <a:spLocks noGrp="1"/>
+          </p:cNvSpPr>
+          <p:nvPr>
+            <p:ph type="title"/>
+          </p:nvPr>
+        </p:nvSpPr>
+        <p:spPr>
+          <a:xfrm>
             <a:off x="2167466" y="32"/>
             <a:ext cx="6519333" cy="446203"/>
           </a:xfrm>
@@ -5880,6 +6683,88 @@
     <p:extLst>
       <p:ext uri="{BB962C8B-B14F-4D97-AF65-F5344CB8AC3E}">
         <p14:creationId xmlns:p14="http://schemas.microsoft.com/office/powerpoint/2010/main" val="3419021002"/>
+      </p:ext>
+    </p:extLst>
+  </p:cSld>
+  <p:clrMapOvr>
+    <a:masterClrMapping/>
+  </p:clrMapOvr>
+</p:sld>
+</file>
+
+<file path=ppt/slides/slide7.xml><?xml version="1.0" encoding="utf-8"?>
+<p:sld xmlns:a="http://schemas.openxmlformats.org/drawingml/2006/main" xmlns:r="http://schemas.openxmlformats.org/officeDocument/2006/relationships" xmlns:p="http://schemas.openxmlformats.org/presentationml/2006/main">
+  <p:cSld>
+    <p:spTree>
+      <p:nvGrpSpPr>
+        <p:cNvPr id="1" name=""/>
+        <p:cNvGrpSpPr/>
+        <p:nvPr/>
+      </p:nvGrpSpPr>
+      <p:grpSpPr>
+        <a:xfrm>
+          <a:off x="0" y="0"/>
+          <a:ext cx="0" cy="0"/>
+          <a:chOff x="0" y="0"/>
+          <a:chExt cx="0" cy="0"/>
+        </a:xfrm>
+      </p:grpSpPr>
+      <p:sp>
+        <p:nvSpPr>
+          <p:cNvPr id="2" name="Title 1"/>
+          <p:cNvSpPr>
+            <a:spLocks noGrp="1"/>
+          </p:cNvSpPr>
+          <p:nvPr>
+            <p:ph type="title"/>
+          </p:nvPr>
+        </p:nvSpPr>
+        <p:spPr/>
+        <p:txBody>
+          <a:bodyPr/>
+          <a:lstStyle/>
+          <a:p>
+            <a:r>
+              <a:rPr lang="en-US" dirty="0" smtClean="0"/>
+              <a:t>Popup Continue</a:t>
+            </a:r>
+            <a:endParaRPr lang="en-US" dirty="0"/>
+          </a:p>
+        </p:txBody>
+      </p:sp>
+      <p:sp>
+        <p:nvSpPr>
+          <p:cNvPr id="3" name="Content Placeholder 2"/>
+          <p:cNvSpPr>
+            <a:spLocks noGrp="1"/>
+          </p:cNvSpPr>
+          <p:nvPr>
+            <p:ph idx="1"/>
+          </p:nvPr>
+        </p:nvSpPr>
+        <p:spPr/>
+        <p:txBody>
+          <a:bodyPr/>
+          <a:lstStyle/>
+          <a:p>
+            <a:r>
+              <a:rPr lang="en-US" dirty="0" smtClean="0"/>
+              <a:t>If the dismiss button or the end game button are pressed then we move to the end menu state.</a:t>
+            </a:r>
+          </a:p>
+          <a:p>
+            <a:r>
+              <a:rPr lang="en-US" dirty="0" smtClean="0"/>
+              <a:t>If the ad or the coin button is pressed then we need to transition to the </a:t>
+            </a:r>
+            <a:endParaRPr lang="en-US" dirty="0"/>
+          </a:p>
+        </p:txBody>
+      </p:sp>
+    </p:spTree>
+    <p:extLst>
+      <p:ext uri="{BB962C8B-B14F-4D97-AF65-F5344CB8AC3E}">
+        <p14:creationId xmlns:p14="http://schemas.microsoft.com/office/powerpoint/2010/main" val="3083123188"/>
       </p:ext>
     </p:extLst>
   </p:cSld>
@@ -6207,4 +7092,324 @@
   </a:objectDefaults>
   <a:extraClrSchemeLst/>
 </a:theme>
+</file>
+
+<file path=ppt/theme/theme2.xml><?xml version="1.0" encoding="utf-8"?>
+<a:theme xmlns:a="http://schemas.openxmlformats.org/drawingml/2006/main" name="Office Theme">
+  <a:themeElements>
+    <a:clrScheme name="Office">
+      <a:dk1>
+        <a:sysClr val="windowText" lastClr="000000"/>
+      </a:dk1>
+      <a:lt1>
+        <a:sysClr val="window" lastClr="FFFFFF"/>
+      </a:lt1>
+      <a:dk2>
+        <a:srgbClr val="1F497D"/>
+      </a:dk2>
+      <a:lt2>
+        <a:srgbClr val="EEECE1"/>
+      </a:lt2>
+      <a:accent1>
+        <a:srgbClr val="4F81BD"/>
+      </a:accent1>
+      <a:accent2>
+        <a:srgbClr val="C0504D"/>
+      </a:accent2>
+      <a:accent3>
+        <a:srgbClr val="9BBB59"/>
+      </a:accent3>
+      <a:accent4>
+        <a:srgbClr val="8064A2"/>
+      </a:accent4>
+      <a:accent5>
+        <a:srgbClr val="4BACC6"/>
+      </a:accent5>
+      <a:accent6>
+        <a:srgbClr val="F79646"/>
+      </a:accent6>
+      <a:hlink>
+        <a:srgbClr val="0000FF"/>
+      </a:hlink>
+      <a:folHlink>
+        <a:srgbClr val="800080"/>
+      </a:folHlink>
+    </a:clrScheme>
+    <a:fontScheme name="Office">
+      <a:majorFont>
+        <a:latin typeface="Calibri"/>
+        <a:ea typeface=""/>
+        <a:cs typeface=""/>
+        <a:font script="Jpan" typeface="ＭＳ Ｐゴシック"/>
+        <a:font script="Hang" typeface="맑은 고딕"/>
+        <a:font script="Hans" typeface="宋体"/>
+        <a:font script="Hant" typeface="新細明體"/>
+        <a:font script="Arab" typeface="Times New Roman"/>
+        <a:font script="Hebr" typeface="Times New Roman"/>
+        <a:font script="Thai" typeface="Angsana New"/>
+        <a:font script="Ethi" typeface="Nyala"/>
+        <a:font script="Beng" typeface="Vrinda"/>
+        <a:font script="Gujr" typeface="Shruti"/>
+        <a:font script="Khmr" typeface="MoolBoran"/>
+        <a:font script="Knda" typeface="Tunga"/>
+        <a:font script="Guru" typeface="Raavi"/>
+        <a:font script="Cans" typeface="Euphemia"/>
+        <a:font script="Cher" typeface="Plantagenet Cherokee"/>
+        <a:font script="Yiii" typeface="Microsoft Yi Baiti"/>
+        <a:font script="Tibt" typeface="Microsoft Himalaya"/>
+        <a:font script="Thaa" typeface="MV Boli"/>
+        <a:font script="Deva" typeface="Mangal"/>
+        <a:font script="Telu" typeface="Gautami"/>
+        <a:font script="Taml" typeface="Latha"/>
+        <a:font script="Syrc" typeface="Estrangelo Edessa"/>
+        <a:font script="Orya" typeface="Kalinga"/>
+        <a:font script="Mlym" typeface="Kartika"/>
+        <a:font script="Laoo" typeface="DokChampa"/>
+        <a:font script="Sinh" typeface="Iskoola Pota"/>
+        <a:font script="Mong" typeface="Mongolian Baiti"/>
+        <a:font script="Viet" typeface="Times New Roman"/>
+        <a:font script="Uigh" typeface="Microsoft Uighur"/>
+        <a:font script="Geor" typeface="Sylfaen"/>
+      </a:majorFont>
+      <a:minorFont>
+        <a:latin typeface="Calibri"/>
+        <a:ea typeface=""/>
+        <a:cs typeface=""/>
+        <a:font script="Jpan" typeface="ＭＳ Ｐゴシック"/>
+        <a:font script="Hang" typeface="맑은 고딕"/>
+        <a:font script="Hans" typeface="宋体"/>
+        <a:font script="Hant" typeface="新細明體"/>
+        <a:font script="Arab" typeface="Arial"/>
+        <a:font script="Hebr" typeface="Arial"/>
+        <a:font script="Thai" typeface="Cordia New"/>
+        <a:font script="Ethi" typeface="Nyala"/>
+        <a:font script="Beng" typeface="Vrinda"/>
+        <a:font script="Gujr" typeface="Shruti"/>
+        <a:font script="Khmr" typeface="DaunPenh"/>
+        <a:font script="Knda" typeface="Tunga"/>
+        <a:font script="Guru" typeface="Raavi"/>
+        <a:font script="Cans" typeface="Euphemia"/>
+        <a:font script="Cher" typeface="Plantagenet Cherokee"/>
+        <a:font script="Yiii" typeface="Microsoft Yi Baiti"/>
+        <a:font script="Tibt" typeface="Microsoft Himalaya"/>
+        <a:font script="Thaa" typeface="MV Boli"/>
+        <a:font script="Deva" typeface="Mangal"/>
+        <a:font script="Telu" typeface="Gautami"/>
+        <a:font script="Taml" typeface="Latha"/>
+        <a:font script="Syrc" typeface="Estrangelo Edessa"/>
+        <a:font script="Orya" typeface="Kalinga"/>
+        <a:font script="Mlym" typeface="Kartika"/>
+        <a:font script="Laoo" typeface="DokChampa"/>
+        <a:font script="Sinh" typeface="Iskoola Pota"/>
+        <a:font script="Mong" typeface="Mongolian Baiti"/>
+        <a:font script="Viet" typeface="Arial"/>
+        <a:font script="Uigh" typeface="Microsoft Uighur"/>
+        <a:font script="Geor" typeface="Sylfaen"/>
+      </a:minorFont>
+    </a:fontScheme>
+    <a:fmtScheme name="Office">
+      <a:fillStyleLst>
+        <a:solidFill>
+          <a:schemeClr val="phClr"/>
+        </a:solidFill>
+        <a:gradFill rotWithShape="1">
+          <a:gsLst>
+            <a:gs pos="0">
+              <a:schemeClr val="phClr">
+                <a:tint val="50000"/>
+                <a:satMod val="300000"/>
+              </a:schemeClr>
+            </a:gs>
+            <a:gs pos="35000">
+              <a:schemeClr val="phClr">
+                <a:tint val="37000"/>
+                <a:satMod val="300000"/>
+              </a:schemeClr>
+            </a:gs>
+            <a:gs pos="100000">
+              <a:schemeClr val="phClr">
+                <a:tint val="15000"/>
+                <a:satMod val="350000"/>
+              </a:schemeClr>
+            </a:gs>
+          </a:gsLst>
+          <a:lin ang="16200000" scaled="1"/>
+        </a:gradFill>
+        <a:gradFill rotWithShape="1">
+          <a:gsLst>
+            <a:gs pos="0">
+              <a:schemeClr val="phClr">
+                <a:tint val="100000"/>
+                <a:shade val="100000"/>
+                <a:satMod val="130000"/>
+              </a:schemeClr>
+            </a:gs>
+            <a:gs pos="100000">
+              <a:schemeClr val="phClr">
+                <a:tint val="50000"/>
+                <a:shade val="100000"/>
+                <a:satMod val="350000"/>
+              </a:schemeClr>
+            </a:gs>
+          </a:gsLst>
+          <a:lin ang="16200000" scaled="0"/>
+        </a:gradFill>
+      </a:fillStyleLst>
+      <a:lnStyleLst>
+        <a:ln w="9525" cap="flat" cmpd="sng" algn="ctr">
+          <a:solidFill>
+            <a:schemeClr val="phClr">
+              <a:shade val="95000"/>
+              <a:satMod val="105000"/>
+            </a:schemeClr>
+          </a:solidFill>
+          <a:prstDash val="solid"/>
+        </a:ln>
+        <a:ln w="25400" cap="flat" cmpd="sng" algn="ctr">
+          <a:solidFill>
+            <a:schemeClr val="phClr"/>
+          </a:solidFill>
+          <a:prstDash val="solid"/>
+        </a:ln>
+        <a:ln w="38100" cap="flat" cmpd="sng" algn="ctr">
+          <a:solidFill>
+            <a:schemeClr val="phClr"/>
+          </a:solidFill>
+          <a:prstDash val="solid"/>
+        </a:ln>
+      </a:lnStyleLst>
+      <a:effectStyleLst>
+        <a:effectStyle>
+          <a:effectLst>
+            <a:outerShdw blurRad="40000" dist="20000" dir="5400000" rotWithShape="0">
+              <a:srgbClr val="000000">
+                <a:alpha val="38000"/>
+              </a:srgbClr>
+            </a:outerShdw>
+          </a:effectLst>
+        </a:effectStyle>
+        <a:effectStyle>
+          <a:effectLst>
+            <a:outerShdw blurRad="40000" dist="23000" dir="5400000" rotWithShape="0">
+              <a:srgbClr val="000000">
+                <a:alpha val="35000"/>
+              </a:srgbClr>
+            </a:outerShdw>
+          </a:effectLst>
+        </a:effectStyle>
+        <a:effectStyle>
+          <a:effectLst>
+            <a:outerShdw blurRad="40000" dist="23000" dir="5400000" rotWithShape="0">
+              <a:srgbClr val="000000">
+                <a:alpha val="35000"/>
+              </a:srgbClr>
+            </a:outerShdw>
+          </a:effectLst>
+          <a:scene3d>
+            <a:camera prst="orthographicFront">
+              <a:rot lat="0" lon="0" rev="0"/>
+            </a:camera>
+            <a:lightRig rig="threePt" dir="t">
+              <a:rot lat="0" lon="0" rev="1200000"/>
+            </a:lightRig>
+          </a:scene3d>
+          <a:sp3d>
+            <a:bevelT w="63500" h="25400"/>
+          </a:sp3d>
+        </a:effectStyle>
+      </a:effectStyleLst>
+      <a:bgFillStyleLst>
+        <a:solidFill>
+          <a:schemeClr val="phClr"/>
+        </a:solidFill>
+        <a:gradFill rotWithShape="1">
+          <a:gsLst>
+            <a:gs pos="0">
+              <a:schemeClr val="phClr">
+                <a:tint val="40000"/>
+                <a:satMod val="350000"/>
+              </a:schemeClr>
+            </a:gs>
+            <a:gs pos="40000">
+              <a:schemeClr val="phClr">
+                <a:tint val="45000"/>
+                <a:shade val="99000"/>
+                <a:satMod val="350000"/>
+              </a:schemeClr>
+            </a:gs>
+            <a:gs pos="100000">
+              <a:schemeClr val="phClr">
+                <a:shade val="20000"/>
+                <a:satMod val="255000"/>
+              </a:schemeClr>
+            </a:gs>
+          </a:gsLst>
+          <a:path path="circle">
+            <a:fillToRect l="50000" t="-80000" r="50000" b="180000"/>
+          </a:path>
+        </a:gradFill>
+        <a:gradFill rotWithShape="1">
+          <a:gsLst>
+            <a:gs pos="0">
+              <a:schemeClr val="phClr">
+                <a:tint val="80000"/>
+                <a:satMod val="300000"/>
+              </a:schemeClr>
+            </a:gs>
+            <a:gs pos="100000">
+              <a:schemeClr val="phClr">
+                <a:shade val="30000"/>
+                <a:satMod val="200000"/>
+              </a:schemeClr>
+            </a:gs>
+          </a:gsLst>
+          <a:path path="circle">
+            <a:fillToRect l="50000" t="50000" r="50000" b="50000"/>
+          </a:path>
+        </a:gradFill>
+      </a:bgFillStyleLst>
+    </a:fmtScheme>
+  </a:themeElements>
+  <a:objectDefaults>
+    <a:spDef>
+      <a:spPr/>
+      <a:bodyPr/>
+      <a:lstStyle/>
+      <a:style>
+        <a:lnRef idx="1">
+          <a:schemeClr val="accent1"/>
+        </a:lnRef>
+        <a:fillRef idx="3">
+          <a:schemeClr val="accent1"/>
+        </a:fillRef>
+        <a:effectRef idx="2">
+          <a:schemeClr val="accent1"/>
+        </a:effectRef>
+        <a:fontRef idx="minor">
+          <a:schemeClr val="lt1"/>
+        </a:fontRef>
+      </a:style>
+    </a:spDef>
+    <a:lnDef>
+      <a:spPr/>
+      <a:bodyPr/>
+      <a:lstStyle/>
+      <a:style>
+        <a:lnRef idx="2">
+          <a:schemeClr val="accent1"/>
+        </a:lnRef>
+        <a:fillRef idx="0">
+          <a:schemeClr val="accent1"/>
+        </a:fillRef>
+        <a:effectRef idx="1">
+          <a:schemeClr val="accent1"/>
+        </a:effectRef>
+        <a:fontRef idx="minor">
+          <a:schemeClr val="tx1"/>
+        </a:fontRef>
+      </a:style>
+    </a:lnDef>
+  </a:objectDefaults>
+  <a:extraClrSchemeLst/>
+</a:theme>
 </file>
</xml_diff>